<commit_message>
updated presentation and report
problem statement, dsm
</commit_message>
<xml_diff>
--- a/MSDO/Assignment5/Mars 2040 Optimization Presentation.pptx
+++ b/MSDO/Assignment5/Mars 2040 Optimization Presentation.pptx
@@ -5,17 +5,22 @@
     <p:sldMasterId id="2147483673" r:id="rId1"/>
   </p:sldMasterIdLst>
   <p:notesMasterIdLst>
-    <p:notesMasterId r:id="rId10"/>
+    <p:notesMasterId r:id="rId15"/>
   </p:notesMasterIdLst>
   <p:sldIdLst>
     <p:sldId id="448" r:id="rId2"/>
     <p:sldId id="565" r:id="rId3"/>
     <p:sldId id="566" r:id="rId4"/>
-    <p:sldId id="567" r:id="rId5"/>
-    <p:sldId id="568" r:id="rId6"/>
-    <p:sldId id="569" r:id="rId7"/>
-    <p:sldId id="570" r:id="rId8"/>
-    <p:sldId id="571" r:id="rId9"/>
+    <p:sldId id="573" r:id="rId5"/>
+    <p:sldId id="574" r:id="rId6"/>
+    <p:sldId id="572" r:id="rId7"/>
+    <p:sldId id="576" r:id="rId8"/>
+    <p:sldId id="567" r:id="rId9"/>
+    <p:sldId id="575" r:id="rId10"/>
+    <p:sldId id="568" r:id="rId11"/>
+    <p:sldId id="569" r:id="rId12"/>
+    <p:sldId id="570" r:id="rId13"/>
+    <p:sldId id="571" r:id="rId14"/>
   </p:sldIdLst>
   <p:sldSz cx="9144000" cy="6858000" type="screen4x3"/>
   <p:notesSz cx="6858000" cy="9144000"/>
@@ -215,7 +220,7 @@
           <a:p>
             <a:fld id="{D292ED30-0A90-45AA-9637-D363BB894E5D}" type="datetimeFigureOut">
               <a:rPr lang="en-US" smtClean="0"/>
-              <a:t>5/3/2016</a:t>
+              <a:t>5/8/2016</a:t>
             </a:fld>
             <a:endParaRPr lang="en-US"/>
           </a:p>
@@ -787,7 +792,65 @@
           <a:bodyPr/>
           <a:lstStyle/>
           <a:p>
-            <a:endParaRPr lang="en-US"/>
+            <a:r>
+              <a:rPr lang="en-US" sz="1200" b="0" i="0" kern="1200" dirty="0" smtClean="0">
+                <a:solidFill>
+                  <a:schemeClr val="tx1"/>
+                </a:solidFill>
+                <a:effectLst/>
+                <a:latin typeface="+mn-lt"/>
+                <a:ea typeface="+mn-ea"/>
+                <a:cs typeface="+mn-cs"/>
+              </a:rPr>
+              <a:t>Open Source:</a:t>
+            </a:r>
+            <a:r>
+              <a:rPr lang="en-US" sz="1200" b="0" i="0" kern="1200" baseline="0" dirty="0" smtClean="0">
+                <a:solidFill>
+                  <a:schemeClr val="tx1"/>
+                </a:solidFill>
+                <a:effectLst/>
+                <a:latin typeface="+mn-lt"/>
+                <a:ea typeface="+mn-ea"/>
+                <a:cs typeface="+mn-cs"/>
+              </a:rPr>
+              <a:t> opensource.org</a:t>
+            </a:r>
+            <a:endParaRPr lang="en-US" sz="1200" b="0" i="0" kern="1200" dirty="0" smtClean="0">
+              <a:solidFill>
+                <a:schemeClr val="tx1"/>
+              </a:solidFill>
+              <a:effectLst/>
+              <a:latin typeface="+mn-lt"/>
+              <a:ea typeface="+mn-ea"/>
+              <a:cs typeface="+mn-cs"/>
+            </a:endParaRPr>
+          </a:p>
+          <a:p>
+            <a:endParaRPr lang="en-US" sz="1200" b="0" i="0" kern="1200" dirty="0" smtClean="0">
+              <a:solidFill>
+                <a:schemeClr val="tx1"/>
+              </a:solidFill>
+              <a:effectLst/>
+              <a:latin typeface="+mn-lt"/>
+              <a:ea typeface="+mn-ea"/>
+              <a:cs typeface="+mn-cs"/>
+            </a:endParaRPr>
+          </a:p>
+          <a:p>
+            <a:r>
+              <a:rPr lang="en-US" sz="1200" b="0" i="0" kern="1200" dirty="0" smtClean="0">
+                <a:solidFill>
+                  <a:schemeClr val="tx1"/>
+                </a:solidFill>
+                <a:effectLst/>
+                <a:latin typeface="+mn-lt"/>
+                <a:ea typeface="+mn-ea"/>
+                <a:cs typeface="+mn-cs"/>
+              </a:rPr>
+              <a:t>Fidelity:</a:t>
+            </a:r>
+            <a:endParaRPr lang="en-US" dirty="0"/>
           </a:p>
         </p:txBody>
       </p:sp>
@@ -808,7 +871,375 @@
           <a:p>
             <a:fld id="{380EEE09-4C39-4D5E-9E9F-B9379C5BD052}" type="slidenum">
               <a:rPr lang="en-US" smtClean="0"/>
-              <a:t>7</a:t>
+              <a:t>4</a:t>
+            </a:fld>
+            <a:endParaRPr lang="en-US"/>
+          </a:p>
+        </p:txBody>
+      </p:sp>
+    </p:spTree>
+    <p:extLst>
+      <p:ext uri="{BB962C8B-B14F-4D97-AF65-F5344CB8AC3E}">
+        <p14:creationId xmlns:p14="http://schemas.microsoft.com/office/powerpoint/2010/main" val="2596866815"/>
+      </p:ext>
+    </p:extLst>
+  </p:cSld>
+  <p:clrMapOvr>
+    <a:masterClrMapping/>
+  </p:clrMapOvr>
+</p:notes>
+</file>
+
+<file path=ppt/notesSlides/notesSlide4.xml><?xml version="1.0" encoding="utf-8"?>
+<p:notes xmlns:a="http://schemas.openxmlformats.org/drawingml/2006/main" xmlns:r="http://schemas.openxmlformats.org/officeDocument/2006/relationships" xmlns:p="http://schemas.openxmlformats.org/presentationml/2006/main">
+  <p:cSld>
+    <p:spTree>
+      <p:nvGrpSpPr>
+        <p:cNvPr id="1" name=""/>
+        <p:cNvGrpSpPr/>
+        <p:nvPr/>
+      </p:nvGrpSpPr>
+      <p:grpSpPr>
+        <a:xfrm>
+          <a:off x="0" y="0"/>
+          <a:ext cx="0" cy="0"/>
+          <a:chOff x="0" y="0"/>
+          <a:chExt cx="0" cy="0"/>
+        </a:xfrm>
+      </p:grpSpPr>
+      <p:sp>
+        <p:nvSpPr>
+          <p:cNvPr id="2" name="Slide Image Placeholder 1"/>
+          <p:cNvSpPr>
+            <a:spLocks noGrp="1" noRot="1" noChangeAspect="1"/>
+          </p:cNvSpPr>
+          <p:nvPr>
+            <p:ph type="sldImg"/>
+          </p:nvPr>
+        </p:nvSpPr>
+        <p:spPr/>
+      </p:sp>
+      <p:sp>
+        <p:nvSpPr>
+          <p:cNvPr id="3" name="Notes Placeholder 2"/>
+          <p:cNvSpPr>
+            <a:spLocks noGrp="1"/>
+          </p:cNvSpPr>
+          <p:nvPr>
+            <p:ph type="body" idx="1"/>
+          </p:nvPr>
+        </p:nvSpPr>
+        <p:spPr/>
+        <p:txBody>
+          <a:bodyPr/>
+          <a:lstStyle/>
+          <a:p>
+            <a:r>
+              <a:rPr lang="en-US" sz="1200" b="0" i="0" kern="1200" dirty="0" smtClean="0">
+                <a:solidFill>
+                  <a:schemeClr val="tx1"/>
+                </a:solidFill>
+                <a:effectLst/>
+                <a:latin typeface="+mn-lt"/>
+                <a:ea typeface="+mn-ea"/>
+                <a:cs typeface="+mn-cs"/>
+              </a:rPr>
+              <a:t>Open Source:</a:t>
+            </a:r>
+            <a:r>
+              <a:rPr lang="en-US" sz="1200" b="0" i="0" kern="1200" baseline="0" dirty="0" smtClean="0">
+                <a:solidFill>
+                  <a:schemeClr val="tx1"/>
+                </a:solidFill>
+                <a:effectLst/>
+                <a:latin typeface="+mn-lt"/>
+                <a:ea typeface="+mn-ea"/>
+                <a:cs typeface="+mn-cs"/>
+              </a:rPr>
+              <a:t> opensource.org</a:t>
+            </a:r>
+            <a:endParaRPr lang="en-US" sz="1200" b="0" i="0" kern="1200" dirty="0" smtClean="0">
+              <a:solidFill>
+                <a:schemeClr val="tx1"/>
+              </a:solidFill>
+              <a:effectLst/>
+              <a:latin typeface="+mn-lt"/>
+              <a:ea typeface="+mn-ea"/>
+              <a:cs typeface="+mn-cs"/>
+            </a:endParaRPr>
+          </a:p>
+          <a:p>
+            <a:endParaRPr lang="en-US" sz="1200" b="0" i="0" kern="1200" dirty="0" smtClean="0">
+              <a:solidFill>
+                <a:schemeClr val="tx1"/>
+              </a:solidFill>
+              <a:effectLst/>
+              <a:latin typeface="+mn-lt"/>
+              <a:ea typeface="+mn-ea"/>
+              <a:cs typeface="+mn-cs"/>
+            </a:endParaRPr>
+          </a:p>
+          <a:p>
+            <a:r>
+              <a:rPr lang="en-US" sz="1200" b="0" i="0" kern="1200" dirty="0" smtClean="0">
+                <a:solidFill>
+                  <a:schemeClr val="tx1"/>
+                </a:solidFill>
+                <a:effectLst/>
+                <a:latin typeface="+mn-lt"/>
+                <a:ea typeface="+mn-ea"/>
+                <a:cs typeface="+mn-cs"/>
+              </a:rPr>
+              <a:t>Fidelity:</a:t>
+            </a:r>
+            <a:endParaRPr lang="en-US" dirty="0"/>
+          </a:p>
+        </p:txBody>
+      </p:sp>
+      <p:sp>
+        <p:nvSpPr>
+          <p:cNvPr id="4" name="Slide Number Placeholder 3"/>
+          <p:cNvSpPr>
+            <a:spLocks noGrp="1"/>
+          </p:cNvSpPr>
+          <p:nvPr>
+            <p:ph type="sldNum" sz="quarter" idx="10"/>
+          </p:nvPr>
+        </p:nvSpPr>
+        <p:spPr/>
+        <p:txBody>
+          <a:bodyPr/>
+          <a:lstStyle/>
+          <a:p>
+            <a:fld id="{380EEE09-4C39-4D5E-9E9F-B9379C5BD052}" type="slidenum">
+              <a:rPr lang="en-US" smtClean="0"/>
+              <a:t>5</a:t>
+            </a:fld>
+            <a:endParaRPr lang="en-US"/>
+          </a:p>
+        </p:txBody>
+      </p:sp>
+    </p:spTree>
+    <p:extLst>
+      <p:ext uri="{BB962C8B-B14F-4D97-AF65-F5344CB8AC3E}">
+        <p14:creationId xmlns:p14="http://schemas.microsoft.com/office/powerpoint/2010/main" val="3866929040"/>
+      </p:ext>
+    </p:extLst>
+  </p:cSld>
+  <p:clrMapOvr>
+    <a:masterClrMapping/>
+  </p:clrMapOvr>
+</p:notes>
+</file>
+
+<file path=ppt/notesSlides/notesSlide5.xml><?xml version="1.0" encoding="utf-8"?>
+<p:notes xmlns:a="http://schemas.openxmlformats.org/drawingml/2006/main" xmlns:r="http://schemas.openxmlformats.org/officeDocument/2006/relationships" xmlns:p="http://schemas.openxmlformats.org/presentationml/2006/main">
+  <p:cSld>
+    <p:spTree>
+      <p:nvGrpSpPr>
+        <p:cNvPr id="1" name=""/>
+        <p:cNvGrpSpPr/>
+        <p:nvPr/>
+      </p:nvGrpSpPr>
+      <p:grpSpPr>
+        <a:xfrm>
+          <a:off x="0" y="0"/>
+          <a:ext cx="0" cy="0"/>
+          <a:chOff x="0" y="0"/>
+          <a:chExt cx="0" cy="0"/>
+        </a:xfrm>
+      </p:grpSpPr>
+      <p:sp>
+        <p:nvSpPr>
+          <p:cNvPr id="2" name="Slide Image Placeholder 1"/>
+          <p:cNvSpPr>
+            <a:spLocks noGrp="1" noRot="1" noChangeAspect="1"/>
+          </p:cNvSpPr>
+          <p:nvPr>
+            <p:ph type="sldImg"/>
+          </p:nvPr>
+        </p:nvSpPr>
+        <p:spPr/>
+      </p:sp>
+      <p:sp>
+        <p:nvSpPr>
+          <p:cNvPr id="3" name="Notes Placeholder 2"/>
+          <p:cNvSpPr>
+            <a:spLocks noGrp="1"/>
+          </p:cNvSpPr>
+          <p:nvPr>
+            <p:ph type="body" idx="1"/>
+          </p:nvPr>
+        </p:nvSpPr>
+        <p:spPr/>
+        <p:txBody>
+          <a:bodyPr/>
+          <a:lstStyle/>
+          <a:p>
+            <a:r>
+              <a:rPr lang="en-US" sz="1200" b="0" i="0" kern="1200" dirty="0" smtClean="0">
+                <a:solidFill>
+                  <a:schemeClr val="tx1"/>
+                </a:solidFill>
+                <a:effectLst/>
+                <a:latin typeface="+mn-lt"/>
+                <a:ea typeface="+mn-ea"/>
+                <a:cs typeface="+mn-cs"/>
+              </a:rPr>
+              <a:t>Open Source:</a:t>
+            </a:r>
+            <a:r>
+              <a:rPr lang="en-US" sz="1200" b="0" i="0" kern="1200" baseline="0" dirty="0" smtClean="0">
+                <a:solidFill>
+                  <a:schemeClr val="tx1"/>
+                </a:solidFill>
+                <a:effectLst/>
+                <a:latin typeface="+mn-lt"/>
+                <a:ea typeface="+mn-ea"/>
+                <a:cs typeface="+mn-cs"/>
+              </a:rPr>
+              <a:t> opensource.org</a:t>
+            </a:r>
+            <a:endParaRPr lang="en-US" sz="1200" b="0" i="0" kern="1200" dirty="0" smtClean="0">
+              <a:solidFill>
+                <a:schemeClr val="tx1"/>
+              </a:solidFill>
+              <a:effectLst/>
+              <a:latin typeface="+mn-lt"/>
+              <a:ea typeface="+mn-ea"/>
+              <a:cs typeface="+mn-cs"/>
+            </a:endParaRPr>
+          </a:p>
+          <a:p>
+            <a:endParaRPr lang="en-US" sz="1200" b="0" i="0" kern="1200" dirty="0" smtClean="0">
+              <a:solidFill>
+                <a:schemeClr val="tx1"/>
+              </a:solidFill>
+              <a:effectLst/>
+              <a:latin typeface="+mn-lt"/>
+              <a:ea typeface="+mn-ea"/>
+              <a:cs typeface="+mn-cs"/>
+            </a:endParaRPr>
+          </a:p>
+          <a:p>
+            <a:r>
+              <a:rPr lang="en-US" sz="1200" b="0" i="0" kern="1200" dirty="0" smtClean="0">
+                <a:solidFill>
+                  <a:schemeClr val="tx1"/>
+                </a:solidFill>
+                <a:effectLst/>
+                <a:latin typeface="+mn-lt"/>
+                <a:ea typeface="+mn-ea"/>
+                <a:cs typeface="+mn-cs"/>
+              </a:rPr>
+              <a:t>Fidelity:</a:t>
+            </a:r>
+            <a:endParaRPr lang="en-US" dirty="0"/>
+          </a:p>
+        </p:txBody>
+      </p:sp>
+      <p:sp>
+        <p:nvSpPr>
+          <p:cNvPr id="4" name="Slide Number Placeholder 3"/>
+          <p:cNvSpPr>
+            <a:spLocks noGrp="1"/>
+          </p:cNvSpPr>
+          <p:nvPr>
+            <p:ph type="sldNum" sz="quarter" idx="10"/>
+          </p:nvPr>
+        </p:nvSpPr>
+        <p:spPr/>
+        <p:txBody>
+          <a:bodyPr/>
+          <a:lstStyle/>
+          <a:p>
+            <a:fld id="{380EEE09-4C39-4D5E-9E9F-B9379C5BD052}" type="slidenum">
+              <a:rPr lang="en-US" smtClean="0"/>
+              <a:t>6</a:t>
+            </a:fld>
+            <a:endParaRPr lang="en-US"/>
+          </a:p>
+        </p:txBody>
+      </p:sp>
+    </p:spTree>
+    <p:extLst>
+      <p:ext uri="{BB962C8B-B14F-4D97-AF65-F5344CB8AC3E}">
+        <p14:creationId xmlns:p14="http://schemas.microsoft.com/office/powerpoint/2010/main" val="3289367928"/>
+      </p:ext>
+    </p:extLst>
+  </p:cSld>
+  <p:clrMapOvr>
+    <a:masterClrMapping/>
+  </p:clrMapOvr>
+</p:notes>
+</file>
+
+<file path=ppt/notesSlides/notesSlide6.xml><?xml version="1.0" encoding="utf-8"?>
+<p:notes xmlns:a="http://schemas.openxmlformats.org/drawingml/2006/main" xmlns:r="http://schemas.openxmlformats.org/officeDocument/2006/relationships" xmlns:p="http://schemas.openxmlformats.org/presentationml/2006/main">
+  <p:cSld>
+    <p:spTree>
+      <p:nvGrpSpPr>
+        <p:cNvPr id="1" name=""/>
+        <p:cNvGrpSpPr/>
+        <p:nvPr/>
+      </p:nvGrpSpPr>
+      <p:grpSpPr>
+        <a:xfrm>
+          <a:off x="0" y="0"/>
+          <a:ext cx="0" cy="0"/>
+          <a:chOff x="0" y="0"/>
+          <a:chExt cx="0" cy="0"/>
+        </a:xfrm>
+      </p:grpSpPr>
+      <p:sp>
+        <p:nvSpPr>
+          <p:cNvPr id="2" name="Slide Image Placeholder 1"/>
+          <p:cNvSpPr>
+            <a:spLocks noGrp="1" noRot="1" noChangeAspect="1"/>
+          </p:cNvSpPr>
+          <p:nvPr>
+            <p:ph type="sldImg"/>
+          </p:nvPr>
+        </p:nvSpPr>
+        <p:spPr/>
+      </p:sp>
+      <p:sp>
+        <p:nvSpPr>
+          <p:cNvPr id="3" name="Notes Placeholder 2"/>
+          <p:cNvSpPr>
+            <a:spLocks noGrp="1"/>
+          </p:cNvSpPr>
+          <p:nvPr>
+            <p:ph type="body" idx="1"/>
+          </p:nvPr>
+        </p:nvSpPr>
+        <p:spPr/>
+        <p:txBody>
+          <a:bodyPr/>
+          <a:lstStyle/>
+          <a:p>
+            <a:endParaRPr lang="en-US"/>
+          </a:p>
+        </p:txBody>
+      </p:sp>
+      <p:sp>
+        <p:nvSpPr>
+          <p:cNvPr id="4" name="Slide Number Placeholder 3"/>
+          <p:cNvSpPr>
+            <a:spLocks noGrp="1"/>
+          </p:cNvSpPr>
+          <p:nvPr>
+            <p:ph type="sldNum" sz="quarter" idx="10"/>
+          </p:nvPr>
+        </p:nvSpPr>
+        <p:spPr/>
+        <p:txBody>
+          <a:bodyPr/>
+          <a:lstStyle/>
+          <a:p>
+            <a:fld id="{380EEE09-4C39-4D5E-9E9F-B9379C5BD052}" type="slidenum">
+              <a:rPr lang="en-US" smtClean="0"/>
+              <a:t>12</a:t>
             </a:fld>
             <a:endParaRPr lang="en-US"/>
           </a:p>
@@ -935,7 +1366,7 @@
                   </a:prstClr>
                 </a:solidFill>
               </a:rPr>
-              <a:t>5/3/2016</a:t>
+              <a:t>5/8/2016</a:t>
             </a:fld>
             <a:endParaRPr lang="en-US">
               <a:solidFill>
@@ -1159,7 +1590,7 @@
                   </a:prstClr>
                 </a:solidFill>
               </a:rPr>
-              <a:t>5/3/2016</a:t>
+              <a:t>5/8/2016</a:t>
             </a:fld>
             <a:endParaRPr lang="en-US">
               <a:solidFill>
@@ -1400,7 +1831,7 @@
                   </a:prstClr>
                 </a:solidFill>
               </a:rPr>
-              <a:t>5/3/2016</a:t>
+              <a:t>5/8/2016</a:t>
             </a:fld>
             <a:endParaRPr lang="en-US">
               <a:solidFill>
@@ -1624,7 +2055,7 @@
                   </a:prstClr>
                 </a:solidFill>
               </a:rPr>
-              <a:t>5/3/2016</a:t>
+              <a:t>5/8/2016</a:t>
             </a:fld>
             <a:endParaRPr lang="en-US">
               <a:solidFill>
@@ -1932,7 +2363,7 @@
                   </a:prstClr>
                 </a:solidFill>
               </a:rPr>
-              <a:t>5/3/2016</a:t>
+              <a:t>5/8/2016</a:t>
             </a:fld>
             <a:endParaRPr lang="en-US">
               <a:solidFill>
@@ -2232,7 +2663,7 @@
                   </a:prstClr>
                 </a:solidFill>
               </a:rPr>
-              <a:t>5/3/2016</a:t>
+              <a:t>5/8/2016</a:t>
             </a:fld>
             <a:endParaRPr lang="en-US">
               <a:solidFill>
@@ -2574,7 +3005,7 @@
                   </a:prstClr>
                 </a:solidFill>
               </a:rPr>
-              <a:t>5/3/2016</a:t>
+              <a:t>5/8/2016</a:t>
             </a:fld>
             <a:endParaRPr lang="en-US">
               <a:solidFill>
@@ -3050,7 +3481,7 @@
                   </a:prstClr>
                 </a:solidFill>
               </a:rPr>
-              <a:t>5/3/2016</a:t>
+              <a:t>5/8/2016</a:t>
             </a:fld>
             <a:endParaRPr lang="en-US">
               <a:solidFill>
@@ -3222,7 +3653,7 @@
                   </a:prstClr>
                 </a:solidFill>
               </a:rPr>
-              <a:t>5/3/2016</a:t>
+              <a:t>5/8/2016</a:t>
             </a:fld>
             <a:endParaRPr lang="en-US">
               <a:solidFill>
@@ -3378,7 +3809,7 @@
                   </a:prstClr>
                 </a:solidFill>
               </a:rPr>
-              <a:t>5/3/2016</a:t>
+              <a:t>5/8/2016</a:t>
             </a:fld>
             <a:endParaRPr lang="en-US">
               <a:solidFill>
@@ -3709,7 +4140,7 @@
                   </a:prstClr>
                 </a:solidFill>
               </a:rPr>
-              <a:t>5/3/2016</a:t>
+              <a:t>5/8/2016</a:t>
             </a:fld>
             <a:endParaRPr lang="en-US">
               <a:solidFill>
@@ -4019,7 +4450,7 @@
                   </a:prstClr>
                 </a:solidFill>
               </a:rPr>
-              <a:t>5/3/2016</a:t>
+              <a:t>5/8/2016</a:t>
             </a:fld>
             <a:endParaRPr lang="en-US">
               <a:solidFill>
@@ -4286,7 +4717,7 @@
                   </a:prstClr>
                 </a:solidFill>
               </a:rPr>
-              <a:t>5/3/2016</a:t>
+              <a:t>5/8/2016</a:t>
             </a:fld>
             <a:endParaRPr lang="en-US">
               <a:solidFill>
@@ -4961,7 +5392,6 @@
               <a:rPr lang="en-US" sz="2800" dirty="0" smtClean="0"/>
               <a:t>16.888 Final Presentation</a:t>
             </a:r>
-            <a:endParaRPr lang="en-US" sz="2800" dirty="0" smtClean="0"/>
           </a:p>
         </p:txBody>
       </p:sp>
@@ -5000,19 +5430,7 @@
                 <a:latin typeface="Arial" pitchFamily="34" charset="0"/>
                 <a:cs typeface="Arial" pitchFamily="34" charset="0"/>
               </a:rPr>
-              <a:t>5</a:t>
-            </a:r>
-            <a:r>
-              <a:rPr lang="en-US" sz="2000" b="1" dirty="0" smtClean="0">
-                <a:solidFill>
-                  <a:prstClr val="white">
-                    <a:lumMod val="50000"/>
-                  </a:prstClr>
-                </a:solidFill>
-                <a:latin typeface="Arial" pitchFamily="34" charset="0"/>
-                <a:cs typeface="Arial" pitchFamily="34" charset="0"/>
-              </a:rPr>
-              <a:t>/10/2016</a:t>
+              <a:t>5/10/2016</a:t>
             </a:r>
             <a:endParaRPr lang="en-US" sz="2000" b="1" dirty="0">
               <a:solidFill>
@@ -5155,15 +5573,6 @@
               </a:rPr>
               <a:t>Sam Wald</a:t>
             </a:r>
-            <a:endParaRPr lang="en-US" sz="2000" b="1" dirty="0" smtClean="0">
-              <a:solidFill>
-                <a:prstClr val="white">
-                  <a:lumMod val="50000"/>
-                </a:prstClr>
-              </a:solidFill>
-              <a:latin typeface="Arial" pitchFamily="34" charset="0"/>
-              <a:cs typeface="Arial" pitchFamily="34" charset="0"/>
-            </a:endParaRPr>
           </a:p>
         </p:txBody>
       </p:sp>
@@ -5228,6 +5637,377 @@
 </p:sld>
 </file>
 
+<file path=ppt/slides/slide10.xml><?xml version="1.0" encoding="utf-8"?>
+<p:sld xmlns:a="http://schemas.openxmlformats.org/drawingml/2006/main" xmlns:r="http://schemas.openxmlformats.org/officeDocument/2006/relationships" xmlns:p="http://schemas.openxmlformats.org/presentationml/2006/main">
+  <p:cSld>
+    <p:spTree>
+      <p:nvGrpSpPr>
+        <p:cNvPr id="1" name=""/>
+        <p:cNvGrpSpPr/>
+        <p:nvPr/>
+      </p:nvGrpSpPr>
+      <p:grpSpPr>
+        <a:xfrm>
+          <a:off x="0" y="0"/>
+          <a:ext cx="0" cy="0"/>
+          <a:chOff x="0" y="0"/>
+          <a:chExt cx="0" cy="0"/>
+        </a:xfrm>
+      </p:grpSpPr>
+      <p:sp>
+        <p:nvSpPr>
+          <p:cNvPr id="2" name="Title 1"/>
+          <p:cNvSpPr>
+            <a:spLocks noGrp="1"/>
+          </p:cNvSpPr>
+          <p:nvPr>
+            <p:ph type="title"/>
+          </p:nvPr>
+        </p:nvSpPr>
+        <p:spPr/>
+        <p:txBody>
+          <a:bodyPr/>
+          <a:lstStyle/>
+          <a:p>
+            <a:r>
+              <a:rPr lang="en-US" dirty="0" smtClean="0"/>
+              <a:t>Single Objective Optimization</a:t>
+            </a:r>
+            <a:endParaRPr lang="en-US" dirty="0"/>
+          </a:p>
+        </p:txBody>
+      </p:sp>
+      <p:sp>
+        <p:nvSpPr>
+          <p:cNvPr id="4" name="Slide Number Placeholder 3"/>
+          <p:cNvSpPr>
+            <a:spLocks noGrp="1"/>
+          </p:cNvSpPr>
+          <p:nvPr>
+            <p:ph type="sldNum" sz="quarter" idx="12"/>
+          </p:nvPr>
+        </p:nvSpPr>
+        <p:spPr/>
+        <p:txBody>
+          <a:bodyPr/>
+          <a:lstStyle/>
+          <a:p>
+            <a:pPr>
+              <a:defRPr/>
+            </a:pPr>
+            <a:fld id="{6E3317FF-6423-48BB-8CF6-A5183FB2D75B}" type="slidenum">
+              <a:rPr lang="en-US" smtClean="0">
+                <a:solidFill>
+                  <a:prstClr val="black">
+                    <a:tint val="75000"/>
+                  </a:prstClr>
+                </a:solidFill>
+              </a:rPr>
+              <a:pPr>
+                <a:defRPr/>
+              </a:pPr>
+              <a:t>10</a:t>
+            </a:fld>
+            <a:endParaRPr lang="en-US">
+              <a:solidFill>
+                <a:prstClr val="black">
+                  <a:tint val="75000"/>
+                </a:prstClr>
+              </a:solidFill>
+            </a:endParaRPr>
+          </a:p>
+        </p:txBody>
+      </p:sp>
+    </p:spTree>
+    <p:extLst>
+      <p:ext uri="{BB962C8B-B14F-4D97-AF65-F5344CB8AC3E}">
+        <p14:creationId xmlns:p14="http://schemas.microsoft.com/office/powerpoint/2010/main" val="1404889025"/>
+      </p:ext>
+    </p:extLst>
+  </p:cSld>
+  <p:clrMapOvr>
+    <a:masterClrMapping/>
+  </p:clrMapOvr>
+</p:sld>
+</file>
+
+<file path=ppt/slides/slide11.xml><?xml version="1.0" encoding="utf-8"?>
+<p:sld xmlns:a="http://schemas.openxmlformats.org/drawingml/2006/main" xmlns:r="http://schemas.openxmlformats.org/officeDocument/2006/relationships" xmlns:p="http://schemas.openxmlformats.org/presentationml/2006/main">
+  <p:cSld>
+    <p:spTree>
+      <p:nvGrpSpPr>
+        <p:cNvPr id="1" name=""/>
+        <p:cNvGrpSpPr/>
+        <p:nvPr/>
+      </p:nvGrpSpPr>
+      <p:grpSpPr>
+        <a:xfrm>
+          <a:off x="0" y="0"/>
+          <a:ext cx="0" cy="0"/>
+          <a:chOff x="0" y="0"/>
+          <a:chExt cx="0" cy="0"/>
+        </a:xfrm>
+      </p:grpSpPr>
+      <p:sp>
+        <p:nvSpPr>
+          <p:cNvPr id="2" name="Title 1"/>
+          <p:cNvSpPr>
+            <a:spLocks noGrp="1"/>
+          </p:cNvSpPr>
+          <p:nvPr>
+            <p:ph type="title"/>
+          </p:nvPr>
+        </p:nvSpPr>
+        <p:spPr/>
+        <p:txBody>
+          <a:bodyPr/>
+          <a:lstStyle/>
+          <a:p>
+            <a:r>
+              <a:rPr lang="en-US" dirty="0" smtClean="0"/>
+              <a:t>Multi-Objective Optimization</a:t>
+            </a:r>
+            <a:endParaRPr lang="en-US" dirty="0"/>
+          </a:p>
+        </p:txBody>
+      </p:sp>
+      <p:sp>
+        <p:nvSpPr>
+          <p:cNvPr id="5" name="Slide Number Placeholder 4"/>
+          <p:cNvSpPr>
+            <a:spLocks noGrp="1"/>
+          </p:cNvSpPr>
+          <p:nvPr>
+            <p:ph type="sldNum" sz="quarter" idx="12"/>
+          </p:nvPr>
+        </p:nvSpPr>
+        <p:spPr/>
+        <p:txBody>
+          <a:bodyPr/>
+          <a:lstStyle/>
+          <a:p>
+            <a:pPr>
+              <a:defRPr/>
+            </a:pPr>
+            <a:fld id="{6E3317FF-6423-48BB-8CF6-A5183FB2D75B}" type="slidenum">
+              <a:rPr lang="en-US" smtClean="0">
+                <a:solidFill>
+                  <a:prstClr val="black">
+                    <a:tint val="75000"/>
+                  </a:prstClr>
+                </a:solidFill>
+              </a:rPr>
+              <a:pPr>
+                <a:defRPr/>
+              </a:pPr>
+              <a:t>11</a:t>
+            </a:fld>
+            <a:endParaRPr lang="en-US">
+              <a:solidFill>
+                <a:prstClr val="black">
+                  <a:tint val="75000"/>
+                </a:prstClr>
+              </a:solidFill>
+            </a:endParaRPr>
+          </a:p>
+        </p:txBody>
+      </p:sp>
+    </p:spTree>
+    <p:extLst>
+      <p:ext uri="{BB962C8B-B14F-4D97-AF65-F5344CB8AC3E}">
+        <p14:creationId xmlns:p14="http://schemas.microsoft.com/office/powerpoint/2010/main" val="4109803144"/>
+      </p:ext>
+    </p:extLst>
+  </p:cSld>
+  <p:clrMapOvr>
+    <a:masterClrMapping/>
+  </p:clrMapOvr>
+</p:sld>
+</file>
+
+<file path=ppt/slides/slide12.xml><?xml version="1.0" encoding="utf-8"?>
+<p:sld xmlns:a="http://schemas.openxmlformats.org/drawingml/2006/main" xmlns:r="http://schemas.openxmlformats.org/officeDocument/2006/relationships" xmlns:p="http://schemas.openxmlformats.org/presentationml/2006/main">
+  <p:cSld>
+    <p:spTree>
+      <p:nvGrpSpPr>
+        <p:cNvPr id="1" name=""/>
+        <p:cNvGrpSpPr/>
+        <p:nvPr/>
+      </p:nvGrpSpPr>
+      <p:grpSpPr>
+        <a:xfrm>
+          <a:off x="0" y="0"/>
+          <a:ext cx="0" cy="0"/>
+          <a:chOff x="0" y="0"/>
+          <a:chExt cx="0" cy="0"/>
+        </a:xfrm>
+      </p:grpSpPr>
+      <p:sp>
+        <p:nvSpPr>
+          <p:cNvPr id="2" name="Title 1"/>
+          <p:cNvSpPr>
+            <a:spLocks noGrp="1"/>
+          </p:cNvSpPr>
+          <p:nvPr>
+            <p:ph type="title"/>
+          </p:nvPr>
+        </p:nvSpPr>
+        <p:spPr/>
+        <p:txBody>
+          <a:bodyPr/>
+          <a:lstStyle/>
+          <a:p>
+            <a:r>
+              <a:rPr lang="en-US" dirty="0" smtClean="0"/>
+              <a:t>Final Recommendation</a:t>
+            </a:r>
+            <a:endParaRPr lang="en-US" dirty="0"/>
+          </a:p>
+        </p:txBody>
+      </p:sp>
+      <p:sp>
+        <p:nvSpPr>
+          <p:cNvPr id="4" name="Slide Number Placeholder 3"/>
+          <p:cNvSpPr>
+            <a:spLocks noGrp="1"/>
+          </p:cNvSpPr>
+          <p:nvPr>
+            <p:ph type="sldNum" sz="quarter" idx="12"/>
+          </p:nvPr>
+        </p:nvSpPr>
+        <p:spPr/>
+        <p:txBody>
+          <a:bodyPr/>
+          <a:lstStyle/>
+          <a:p>
+            <a:pPr>
+              <a:defRPr/>
+            </a:pPr>
+            <a:fld id="{6E3317FF-6423-48BB-8CF6-A5183FB2D75B}" type="slidenum">
+              <a:rPr lang="en-US" smtClean="0">
+                <a:solidFill>
+                  <a:prstClr val="black">
+                    <a:tint val="75000"/>
+                  </a:prstClr>
+                </a:solidFill>
+              </a:rPr>
+              <a:pPr>
+                <a:defRPr/>
+              </a:pPr>
+              <a:t>12</a:t>
+            </a:fld>
+            <a:endParaRPr lang="en-US">
+              <a:solidFill>
+                <a:prstClr val="black">
+                  <a:tint val="75000"/>
+                </a:prstClr>
+              </a:solidFill>
+            </a:endParaRPr>
+          </a:p>
+        </p:txBody>
+      </p:sp>
+    </p:spTree>
+    <p:extLst>
+      <p:ext uri="{BB962C8B-B14F-4D97-AF65-F5344CB8AC3E}">
+        <p14:creationId xmlns:p14="http://schemas.microsoft.com/office/powerpoint/2010/main" val="875133285"/>
+      </p:ext>
+    </p:extLst>
+  </p:cSld>
+  <p:clrMapOvr>
+    <a:masterClrMapping/>
+  </p:clrMapOvr>
+</p:sld>
+</file>
+
+<file path=ppt/slides/slide13.xml><?xml version="1.0" encoding="utf-8"?>
+<p:sld xmlns:a="http://schemas.openxmlformats.org/drawingml/2006/main" xmlns:r="http://schemas.openxmlformats.org/officeDocument/2006/relationships" xmlns:p="http://schemas.openxmlformats.org/presentationml/2006/main">
+  <p:cSld>
+    <p:spTree>
+      <p:nvGrpSpPr>
+        <p:cNvPr id="1" name=""/>
+        <p:cNvGrpSpPr/>
+        <p:nvPr/>
+      </p:nvGrpSpPr>
+      <p:grpSpPr>
+        <a:xfrm>
+          <a:off x="0" y="0"/>
+          <a:ext cx="0" cy="0"/>
+          <a:chOff x="0" y="0"/>
+          <a:chExt cx="0" cy="0"/>
+        </a:xfrm>
+      </p:grpSpPr>
+      <p:sp>
+        <p:nvSpPr>
+          <p:cNvPr id="2" name="Title 1"/>
+          <p:cNvSpPr>
+            <a:spLocks noGrp="1"/>
+          </p:cNvSpPr>
+          <p:nvPr>
+            <p:ph type="title"/>
+          </p:nvPr>
+        </p:nvSpPr>
+        <p:spPr/>
+        <p:txBody>
+          <a:bodyPr/>
+          <a:lstStyle/>
+          <a:p>
+            <a:r>
+              <a:rPr lang="en-US" dirty="0" smtClean="0"/>
+              <a:t>Learnings and Future Work</a:t>
+            </a:r>
+            <a:endParaRPr lang="en-US" dirty="0"/>
+          </a:p>
+        </p:txBody>
+      </p:sp>
+      <p:sp>
+        <p:nvSpPr>
+          <p:cNvPr id="12" name="Slide Number Placeholder 3"/>
+          <p:cNvSpPr>
+            <a:spLocks noGrp="1"/>
+          </p:cNvSpPr>
+          <p:nvPr>
+            <p:ph type="sldNum" sz="quarter" idx="12"/>
+          </p:nvPr>
+        </p:nvSpPr>
+        <p:spPr>
+          <a:xfrm>
+            <a:off x="6553200" y="6172200"/>
+            <a:ext cx="2133600" cy="365125"/>
+          </a:xfrm>
+        </p:spPr>
+        <p:txBody>
+          <a:bodyPr/>
+          <a:lstStyle/>
+          <a:p>
+            <a:pPr>
+              <a:defRPr/>
+            </a:pPr>
+            <a:r>
+              <a:rPr lang="en-US" dirty="0">
+                <a:solidFill>
+                  <a:prstClr val="black">
+                    <a:tint val="75000"/>
+                  </a:prstClr>
+                </a:solidFill>
+              </a:rPr>
+              <a:t>8</a:t>
+            </a:r>
+          </a:p>
+        </p:txBody>
+      </p:sp>
+    </p:spTree>
+    <p:extLst>
+      <p:ext uri="{BB962C8B-B14F-4D97-AF65-F5344CB8AC3E}">
+        <p14:creationId xmlns:p14="http://schemas.microsoft.com/office/powerpoint/2010/main" val="300718594"/>
+      </p:ext>
+    </p:extLst>
+  </p:cSld>
+  <p:clrMapOvr>
+    <a:masterClrMapping/>
+  </p:clrMapOvr>
+</p:sld>
+</file>
+
 <file path=ppt/slides/slide2.xml><?xml version="1.0" encoding="utf-8"?>
 <p:sld xmlns:a="http://schemas.openxmlformats.org/drawingml/2006/main" xmlns:r="http://schemas.openxmlformats.org/officeDocument/2006/relationships" xmlns:p="http://schemas.openxmlformats.org/presentationml/2006/main">
   <p:cSld>
@@ -5332,6 +6112,40 @@
           <a:lstStyle/>
           <a:p>
             <a:endParaRPr lang="en-US" dirty="0"/>
+          </a:p>
+        </p:txBody>
+      </p:sp>
+      <p:sp>
+        <p:nvSpPr>
+          <p:cNvPr id="6" name="TextBox 5"/>
+          <p:cNvSpPr txBox="1"/>
+          <p:nvPr/>
+        </p:nvSpPr>
+        <p:spPr>
+          <a:xfrm>
+            <a:off x="457200" y="1066800"/>
+            <a:ext cx="8382000" cy="461665"/>
+          </a:xfrm>
+          <a:prstGeom prst="rect">
+            <a:avLst/>
+          </a:prstGeom>
+          <a:noFill/>
+        </p:spPr>
+        <p:txBody>
+          <a:bodyPr wrap="square" rtlCol="0">
+            <a:spAutoFit/>
+          </a:bodyPr>
+          <a:lstStyle/>
+          <a:p>
+            <a:pPr marL="285750" indent="-285750">
+              <a:buFont typeface="Arial" panose="020B0604020202020204" pitchFamily="34" charset="0"/>
+              <a:buChar char="•"/>
+            </a:pPr>
+            <a:r>
+              <a:rPr lang="en-US" sz="2400" smtClean="0"/>
+              <a:t>Objectives</a:t>
+            </a:r>
+            <a:endParaRPr lang="en-US" sz="2400" dirty="0" smtClean="0"/>
           </a:p>
         </p:txBody>
       </p:sp>
@@ -5367,29 +6181,6 @@
       </p:grpSpPr>
       <p:sp>
         <p:nvSpPr>
-          <p:cNvPr id="2" name="Title 1"/>
-          <p:cNvSpPr>
-            <a:spLocks noGrp="1"/>
-          </p:cNvSpPr>
-          <p:nvPr>
-            <p:ph type="title"/>
-          </p:nvPr>
-        </p:nvSpPr>
-        <p:spPr/>
-        <p:txBody>
-          <a:bodyPr/>
-          <a:lstStyle/>
-          <a:p>
-            <a:r>
-              <a:rPr lang="en-US" dirty="0" smtClean="0"/>
-              <a:t>Problem Formulation</a:t>
-            </a:r>
-            <a:endParaRPr lang="en-US" dirty="0"/>
-          </a:p>
-        </p:txBody>
-      </p:sp>
-      <p:sp>
-        <p:nvSpPr>
           <p:cNvPr id="4" name="Slide Number Placeholder 3"/>
           <p:cNvSpPr>
             <a:spLocks noGrp="1"/>
@@ -5429,6 +6220,176 @@
           </a:p>
         </p:txBody>
       </p:sp>
+      <p:sp>
+        <p:nvSpPr>
+          <p:cNvPr id="2" name="Title 1"/>
+          <p:cNvSpPr>
+            <a:spLocks noGrp="1"/>
+          </p:cNvSpPr>
+          <p:nvPr>
+            <p:ph type="title" idx="4294967295"/>
+          </p:nvPr>
+        </p:nvSpPr>
+        <p:spPr>
+          <a:xfrm>
+            <a:off x="3124200" y="0"/>
+            <a:ext cx="6019800" cy="838200"/>
+          </a:xfrm>
+        </p:spPr>
+        <p:txBody>
+          <a:bodyPr/>
+          <a:lstStyle/>
+          <a:p>
+            <a:r>
+              <a:rPr lang="en-US" dirty="0" smtClean="0"/>
+              <a:t>Problem </a:t>
+            </a:r>
+            <a:r>
+              <a:rPr lang="en-US" dirty="0" smtClean="0"/>
+              <a:t>Formulation: Objectives</a:t>
+            </a:r>
+            <a:endParaRPr lang="en-US" dirty="0"/>
+          </a:p>
+        </p:txBody>
+      </p:sp>
+      <p:sp>
+        <p:nvSpPr>
+          <p:cNvPr id="7" name="TextBox 6"/>
+          <p:cNvSpPr txBox="1"/>
+          <p:nvPr/>
+        </p:nvSpPr>
+        <p:spPr>
+          <a:xfrm>
+            <a:off x="457200" y="1066800"/>
+            <a:ext cx="8382000" cy="2739211"/>
+          </a:xfrm>
+          <a:prstGeom prst="rect">
+            <a:avLst/>
+          </a:prstGeom>
+          <a:noFill/>
+        </p:spPr>
+        <p:txBody>
+          <a:bodyPr wrap="square" rtlCol="0">
+            <a:spAutoFit/>
+          </a:bodyPr>
+          <a:lstStyle/>
+          <a:p>
+            <a:pPr marL="285750" indent="-285750">
+              <a:buFont typeface="Arial" panose="020B0604020202020204" pitchFamily="34" charset="0"/>
+              <a:buChar char="•"/>
+            </a:pPr>
+            <a:r>
+              <a:rPr lang="en-US" sz="2400" dirty="0" smtClean="0"/>
+              <a:t>Objectives</a:t>
+            </a:r>
+          </a:p>
+          <a:p>
+            <a:pPr marL="742950" lvl="1" indent="-285750">
+              <a:buFont typeface="Arial" panose="020B0604020202020204" pitchFamily="34" charset="0"/>
+              <a:buChar char="•"/>
+            </a:pPr>
+            <a:r>
+              <a:rPr lang="en-US" sz="2000" dirty="0" smtClean="0"/>
+              <a:t>Science Utility</a:t>
+            </a:r>
+          </a:p>
+          <a:p>
+            <a:pPr marL="1200150" lvl="2" indent="-285750">
+              <a:buFont typeface="Arial" panose="020B0604020202020204" pitchFamily="34" charset="0"/>
+              <a:buChar char="•"/>
+            </a:pPr>
+            <a:r>
+              <a:rPr lang="en-US" dirty="0" smtClean="0"/>
+              <a:t>Number of Crew Hours</a:t>
+            </a:r>
+          </a:p>
+          <a:p>
+            <a:pPr marL="1200150" lvl="2" indent="-285750">
+              <a:buFont typeface="Arial" panose="020B0604020202020204" pitchFamily="34" charset="0"/>
+              <a:buChar char="•"/>
+            </a:pPr>
+            <a:r>
+              <a:rPr lang="en-US" dirty="0" smtClean="0"/>
+              <a:t>Location Scientific Quality</a:t>
+            </a:r>
+          </a:p>
+          <a:p>
+            <a:pPr marL="742950" lvl="1" indent="-285750">
+              <a:buFont typeface="Arial" panose="020B0604020202020204" pitchFamily="34" charset="0"/>
+              <a:buChar char="•"/>
+            </a:pPr>
+            <a:r>
+              <a:rPr lang="en-US" sz="2000" dirty="0" smtClean="0"/>
+              <a:t>Cost</a:t>
+            </a:r>
+          </a:p>
+          <a:p>
+            <a:pPr marL="1200150" lvl="2" indent="-285750">
+              <a:buFont typeface="Arial" panose="020B0604020202020204" pitchFamily="34" charset="0"/>
+              <a:buChar char="•"/>
+            </a:pPr>
+            <a:r>
+              <a:rPr lang="en-US" dirty="0" smtClean="0"/>
+              <a:t>Resupply Cost </a:t>
+            </a:r>
+          </a:p>
+          <a:p>
+            <a:pPr marL="1657350" lvl="3" indent="-285750">
+              <a:buFont typeface="Arial" panose="020B0604020202020204" pitchFamily="34" charset="0"/>
+              <a:buChar char="•"/>
+            </a:pPr>
+            <a:r>
+              <a:rPr lang="en-US" dirty="0" smtClean="0"/>
+              <a:t>Total IMLEO</a:t>
+            </a:r>
+          </a:p>
+          <a:p>
+            <a:pPr marL="1200150" lvl="2" indent="-285750">
+              <a:buFont typeface="Arial" panose="020B0604020202020204" pitchFamily="34" charset="0"/>
+              <a:buChar char="•"/>
+            </a:pPr>
+            <a:r>
+              <a:rPr lang="en-US" dirty="0" smtClean="0"/>
+              <a:t>Development Cost</a:t>
+            </a:r>
+          </a:p>
+          <a:p>
+            <a:pPr marL="1657350" lvl="3" indent="-285750">
+              <a:buFont typeface="Arial" panose="020B0604020202020204" pitchFamily="34" charset="0"/>
+              <a:buChar char="•"/>
+            </a:pPr>
+            <a:r>
+              <a:rPr lang="en-US" dirty="0" smtClean="0"/>
+              <a:t>Transit Propulsion</a:t>
+            </a:r>
+            <a:endParaRPr lang="en-US" dirty="0"/>
+          </a:p>
+        </p:txBody>
+      </p:sp>
+      <p:pic>
+        <p:nvPicPr>
+          <p:cNvPr id="9" name="Picture 8"/>
+          <p:cNvPicPr>
+            <a:picLocks noChangeAspect="1"/>
+          </p:cNvPicPr>
+          <p:nvPr/>
+        </p:nvPicPr>
+        <p:blipFill>
+          <a:blip r:embed="rId3"/>
+          <a:stretch>
+            <a:fillRect/>
+          </a:stretch>
+        </p:blipFill>
+        <p:spPr>
+          <a:xfrm>
+            <a:off x="1447800" y="4353734"/>
+            <a:ext cx="6719777" cy="820882"/>
+          </a:xfrm>
+          <a:prstGeom prst="rect">
+            <a:avLst/>
+          </a:prstGeom>
+        </p:spPr>
+      </p:pic>
     </p:spTree>
     <p:extLst>
       <p:ext uri="{BB962C8B-B14F-4D97-AF65-F5344CB8AC3E}">
@@ -5461,30 +6422,7 @@
       </p:grpSpPr>
       <p:sp>
         <p:nvSpPr>
-          <p:cNvPr id="2" name="Title 1"/>
-          <p:cNvSpPr>
-            <a:spLocks noGrp="1"/>
-          </p:cNvSpPr>
-          <p:nvPr>
-            <p:ph type="title"/>
-          </p:nvPr>
-        </p:nvSpPr>
-        <p:spPr/>
-        <p:txBody>
-          <a:bodyPr/>
-          <a:lstStyle/>
-          <a:p>
-            <a:r>
-              <a:rPr lang="en-US" dirty="0" smtClean="0"/>
-              <a:t>Modeling and Simulation</a:t>
-            </a:r>
-            <a:endParaRPr lang="en-US" dirty="0"/>
-          </a:p>
-        </p:txBody>
-      </p:sp>
-      <p:sp>
-        <p:nvSpPr>
-          <p:cNvPr id="3" name="Slide Number Placeholder 2"/>
+          <p:cNvPr id="4" name="Slide Number Placeholder 3"/>
           <p:cNvSpPr>
             <a:spLocks noGrp="1"/>
           </p:cNvSpPr>
@@ -5523,10 +6461,133 @@
           </a:p>
         </p:txBody>
       </p:sp>
+      <p:sp>
+        <p:nvSpPr>
+          <p:cNvPr id="2" name="Title 1"/>
+          <p:cNvSpPr>
+            <a:spLocks noGrp="1"/>
+          </p:cNvSpPr>
+          <p:nvPr>
+            <p:ph type="title" idx="4294967295"/>
+          </p:nvPr>
+        </p:nvSpPr>
+        <p:spPr>
+          <a:xfrm>
+            <a:off x="3124200" y="0"/>
+            <a:ext cx="6019800" cy="838200"/>
+          </a:xfrm>
+        </p:spPr>
+        <p:txBody>
+          <a:bodyPr/>
+          <a:lstStyle/>
+          <a:p>
+            <a:r>
+              <a:rPr lang="en-US" dirty="0" smtClean="0"/>
+              <a:t>Problem </a:t>
+            </a:r>
+            <a:r>
+              <a:rPr lang="en-US" dirty="0" smtClean="0"/>
+              <a:t>Formulation: Variables</a:t>
+            </a:r>
+            <a:endParaRPr lang="en-US" dirty="0"/>
+          </a:p>
+        </p:txBody>
+      </p:sp>
+      <p:sp>
+        <p:nvSpPr>
+          <p:cNvPr id="7" name="TextBox 6"/>
+          <p:cNvSpPr txBox="1"/>
+          <p:nvPr/>
+        </p:nvSpPr>
+        <p:spPr>
+          <a:xfrm>
+            <a:off x="457200" y="1066800"/>
+            <a:ext cx="8382000" cy="1384995"/>
+          </a:xfrm>
+          <a:prstGeom prst="rect">
+            <a:avLst/>
+          </a:prstGeom>
+          <a:noFill/>
+        </p:spPr>
+        <p:txBody>
+          <a:bodyPr wrap="square" rtlCol="0">
+            <a:spAutoFit/>
+          </a:bodyPr>
+          <a:lstStyle/>
+          <a:p>
+            <a:pPr marL="342900" indent="-342900">
+              <a:buFont typeface="Arial" panose="020B0604020202020204" pitchFamily="34" charset="0"/>
+              <a:buChar char="•"/>
+            </a:pPr>
+            <a:r>
+              <a:rPr lang="en-US" sz="2400" dirty="0" smtClean="0"/>
+              <a:t>Design </a:t>
+            </a:r>
+            <a:r>
+              <a:rPr lang="en-US" sz="2400" dirty="0"/>
+              <a:t>Variables</a:t>
+            </a:r>
+          </a:p>
+          <a:p>
+            <a:pPr marL="742950" lvl="1" indent="-285750">
+              <a:buFont typeface="Arial" panose="020B0604020202020204" pitchFamily="34" charset="0"/>
+              <a:buChar char="•"/>
+            </a:pPr>
+            <a:r>
+              <a:rPr lang="en-US" sz="2000" dirty="0" smtClean="0"/>
+              <a:t>10 Total Variables</a:t>
+            </a:r>
+          </a:p>
+          <a:p>
+            <a:pPr marL="742950" lvl="1" indent="-285750">
+              <a:buFont typeface="Arial" panose="020B0604020202020204" pitchFamily="34" charset="0"/>
+              <a:buChar char="•"/>
+            </a:pPr>
+            <a:r>
+              <a:rPr lang="en-US" sz="2000" dirty="0" smtClean="0"/>
+              <a:t>8 Discrete Variables</a:t>
+            </a:r>
+          </a:p>
+          <a:p>
+            <a:pPr marL="742950" lvl="1" indent="-285750">
+              <a:buFont typeface="Arial" panose="020B0604020202020204" pitchFamily="34" charset="0"/>
+              <a:buChar char="•"/>
+            </a:pPr>
+            <a:r>
+              <a:rPr lang="en-US" sz="2000" dirty="0" smtClean="0"/>
+              <a:t>2 Continuous Variables</a:t>
+            </a:r>
+          </a:p>
+        </p:txBody>
+      </p:sp>
+      <p:pic>
+        <p:nvPicPr>
+          <p:cNvPr id="6" name="Picture 5"/>
+          <p:cNvPicPr>
+            <a:picLocks noChangeAspect="1"/>
+          </p:cNvPicPr>
+          <p:nvPr/>
+        </p:nvPicPr>
+        <p:blipFill>
+          <a:blip r:embed="rId3"/>
+          <a:stretch>
+            <a:fillRect/>
+          </a:stretch>
+        </p:blipFill>
+        <p:spPr>
+          <a:xfrm>
+            <a:off x="1981200" y="3372579"/>
+            <a:ext cx="5013614" cy="2951941"/>
+          </a:xfrm>
+          <a:prstGeom prst="rect">
+            <a:avLst/>
+          </a:prstGeom>
+        </p:spPr>
+      </p:pic>
     </p:spTree>
     <p:extLst>
       <p:ext uri="{BB962C8B-B14F-4D97-AF65-F5344CB8AC3E}">
-        <p14:creationId xmlns:p14="http://schemas.microsoft.com/office/powerpoint/2010/main" val="1103405663"/>
+        <p14:creationId xmlns:p14="http://schemas.microsoft.com/office/powerpoint/2010/main" val="2203523392"/>
       </p:ext>
     </p:extLst>
   </p:cSld>
@@ -5555,29 +6616,6 @@
       </p:grpSpPr>
       <p:sp>
         <p:nvSpPr>
-          <p:cNvPr id="2" name="Title 1"/>
-          <p:cNvSpPr>
-            <a:spLocks noGrp="1"/>
-          </p:cNvSpPr>
-          <p:nvPr>
-            <p:ph type="title"/>
-          </p:nvPr>
-        </p:nvSpPr>
-        <p:spPr/>
-        <p:txBody>
-          <a:bodyPr/>
-          <a:lstStyle/>
-          <a:p>
-            <a:r>
-              <a:rPr lang="en-US" dirty="0" smtClean="0"/>
-              <a:t>Single Objective Optimization</a:t>
-            </a:r>
-            <a:endParaRPr lang="en-US" dirty="0"/>
-          </a:p>
-        </p:txBody>
-      </p:sp>
-      <p:sp>
-        <p:nvSpPr>
           <p:cNvPr id="4" name="Slide Number Placeholder 3"/>
           <p:cNvSpPr>
             <a:spLocks noGrp="1"/>
@@ -5617,10 +6655,293 @@
           </a:p>
         </p:txBody>
       </p:sp>
+      <p:sp>
+        <p:nvSpPr>
+          <p:cNvPr id="2" name="Title 1"/>
+          <p:cNvSpPr>
+            <a:spLocks noGrp="1"/>
+          </p:cNvSpPr>
+          <p:nvPr>
+            <p:ph type="title" idx="4294967295"/>
+          </p:nvPr>
+        </p:nvSpPr>
+        <p:spPr>
+          <a:xfrm>
+            <a:off x="3124200" y="0"/>
+            <a:ext cx="6019800" cy="838200"/>
+          </a:xfrm>
+        </p:spPr>
+        <p:txBody>
+          <a:bodyPr/>
+          <a:lstStyle/>
+          <a:p>
+            <a:r>
+              <a:rPr lang="en-US" dirty="0" smtClean="0"/>
+              <a:t>Problem </a:t>
+            </a:r>
+            <a:r>
+              <a:rPr lang="en-US" dirty="0" smtClean="0"/>
+              <a:t>Formulation: </a:t>
+            </a:r>
+            <a:br>
+              <a:rPr lang="en-US" dirty="0" smtClean="0"/>
+            </a:br>
+            <a:r>
+              <a:rPr lang="en-US" dirty="0" smtClean="0"/>
+              <a:t>Bounds and Constraints</a:t>
+            </a:r>
+            <a:endParaRPr lang="en-US" dirty="0"/>
+          </a:p>
+        </p:txBody>
+      </p:sp>
+      <p:sp>
+        <p:nvSpPr>
+          <p:cNvPr id="7" name="TextBox 6"/>
+          <p:cNvSpPr txBox="1"/>
+          <p:nvPr/>
+        </p:nvSpPr>
+        <p:spPr>
+          <a:xfrm>
+            <a:off x="457200" y="1066799"/>
+            <a:ext cx="8382000" cy="3047667"/>
+          </a:xfrm>
+          <a:prstGeom prst="rect">
+            <a:avLst/>
+          </a:prstGeom>
+          <a:noFill/>
+        </p:spPr>
+        <p:txBody>
+          <a:bodyPr wrap="square" numCol="2" rtlCol="0">
+            <a:noAutofit/>
+          </a:bodyPr>
+          <a:lstStyle/>
+          <a:p>
+            <a:pPr marL="342900" indent="-342900">
+              <a:buFont typeface="Arial" panose="020B0604020202020204" pitchFamily="34" charset="0"/>
+              <a:buChar char="•"/>
+            </a:pPr>
+            <a:r>
+              <a:rPr lang="en-US" sz="2400" dirty="0" smtClean="0"/>
+              <a:t>Bounds</a:t>
+            </a:r>
+          </a:p>
+          <a:p>
+            <a:pPr marL="800100" lvl="1" indent="-342900">
+              <a:buFont typeface="Arial" panose="020B0604020202020204" pitchFamily="34" charset="0"/>
+              <a:buChar char="•"/>
+            </a:pPr>
+            <a:r>
+              <a:rPr lang="en-US" sz="2000" dirty="0" smtClean="0"/>
+              <a:t>Current Mars information</a:t>
+            </a:r>
+          </a:p>
+          <a:p>
+            <a:pPr marL="800100" lvl="1" indent="-342900">
+              <a:buFont typeface="Arial" panose="020B0604020202020204" pitchFamily="34" charset="0"/>
+              <a:buChar char="•"/>
+            </a:pPr>
+            <a:r>
+              <a:rPr lang="en-US" sz="2000" dirty="0" smtClean="0"/>
+              <a:t>Theoretical limits</a:t>
+            </a:r>
+          </a:p>
+          <a:p>
+            <a:pPr marL="800100" lvl="1" indent="-342900">
+              <a:buFont typeface="Arial" panose="020B0604020202020204" pitchFamily="34" charset="0"/>
+              <a:buChar char="•"/>
+            </a:pPr>
+            <a:r>
+              <a:rPr lang="en-US" sz="2000" dirty="0"/>
+              <a:t>Current </a:t>
+            </a:r>
+            <a:r>
+              <a:rPr lang="en-US" sz="2000" dirty="0" smtClean="0"/>
+              <a:t>capabilities</a:t>
+            </a:r>
+          </a:p>
+          <a:p>
+            <a:pPr marL="800100" lvl="1" indent="-342900">
+              <a:buFont typeface="Arial" panose="020B0604020202020204" pitchFamily="34" charset="0"/>
+              <a:buChar char="•"/>
+            </a:pPr>
+            <a:r>
+              <a:rPr lang="en-US" sz="2000" dirty="0" smtClean="0"/>
+              <a:t>Expected developments</a:t>
+            </a:r>
+          </a:p>
+          <a:p>
+            <a:pPr marL="800100" lvl="1" indent="-342900">
+              <a:buFont typeface="Arial" panose="020B0604020202020204" pitchFamily="34" charset="0"/>
+              <a:buChar char="•"/>
+            </a:pPr>
+            <a:endParaRPr lang="en-US" sz="2000" dirty="0"/>
+          </a:p>
+          <a:p>
+            <a:pPr marL="800100" lvl="1" indent="-342900">
+              <a:buFont typeface="Arial" panose="020B0604020202020204" pitchFamily="34" charset="0"/>
+              <a:buChar char="•"/>
+            </a:pPr>
+            <a:endParaRPr lang="en-US" sz="2000" dirty="0" smtClean="0"/>
+          </a:p>
+          <a:p>
+            <a:pPr marL="800100" lvl="1" indent="-342900">
+              <a:buFont typeface="Arial" panose="020B0604020202020204" pitchFamily="34" charset="0"/>
+              <a:buChar char="•"/>
+            </a:pPr>
+            <a:endParaRPr lang="en-US" sz="2000" dirty="0"/>
+          </a:p>
+          <a:p>
+            <a:pPr marL="800100" lvl="1" indent="-342900">
+              <a:buFont typeface="Arial" panose="020B0604020202020204" pitchFamily="34" charset="0"/>
+              <a:buChar char="•"/>
+            </a:pPr>
+            <a:endParaRPr lang="en-US" sz="2000" dirty="0" smtClean="0"/>
+          </a:p>
+          <a:p>
+            <a:pPr marL="800100" lvl="1" indent="-342900">
+              <a:buFont typeface="Arial" panose="020B0604020202020204" pitchFamily="34" charset="0"/>
+              <a:buChar char="•"/>
+            </a:pPr>
+            <a:endParaRPr lang="en-US" sz="2000" dirty="0" smtClean="0"/>
+          </a:p>
+          <a:p>
+            <a:pPr lvl="1"/>
+            <a:endParaRPr lang="en-US" sz="2000" dirty="0" smtClean="0"/>
+          </a:p>
+          <a:p>
+            <a:pPr marL="342900" indent="-342900">
+              <a:buFont typeface="Arial" panose="020B0604020202020204" pitchFamily="34" charset="0"/>
+              <a:buChar char="•"/>
+            </a:pPr>
+            <a:r>
+              <a:rPr lang="en-US" sz="2400" dirty="0" smtClean="0"/>
+              <a:t>Constraints</a:t>
+            </a:r>
+          </a:p>
+          <a:p>
+            <a:pPr marL="800100" lvl="1" indent="-342900">
+              <a:buFont typeface="Arial" panose="020B0604020202020204" pitchFamily="34" charset="0"/>
+              <a:buChar char="•"/>
+            </a:pPr>
+            <a:r>
+              <a:rPr lang="en-US" sz="2000" dirty="0" smtClean="0"/>
+              <a:t>Physics-based</a:t>
+            </a:r>
+          </a:p>
+          <a:p>
+            <a:pPr marL="800100" lvl="1" indent="-342900">
+              <a:buFont typeface="Arial" panose="020B0604020202020204" pitchFamily="34" charset="0"/>
+              <a:buChar char="•"/>
+            </a:pPr>
+            <a:r>
+              <a:rPr lang="en-US" sz="2000" dirty="0" smtClean="0"/>
+              <a:t>Drivers of system sizing</a:t>
+            </a:r>
+          </a:p>
+          <a:p>
+            <a:pPr marL="1257300" lvl="2" indent="-342900">
+              <a:buFont typeface="Arial" panose="020B0604020202020204" pitchFamily="34" charset="0"/>
+              <a:buChar char="•"/>
+            </a:pPr>
+            <a:r>
+              <a:rPr lang="en-US" dirty="0" smtClean="0"/>
+              <a:t>Habitation</a:t>
+            </a:r>
+          </a:p>
+          <a:p>
+            <a:pPr marL="1257300" lvl="2" indent="-342900">
+              <a:buFont typeface="Arial" panose="020B0604020202020204" pitchFamily="34" charset="0"/>
+              <a:buChar char="•"/>
+            </a:pPr>
+            <a:r>
+              <a:rPr lang="en-US" dirty="0" smtClean="0"/>
+              <a:t>Transportation</a:t>
+            </a:r>
+          </a:p>
+          <a:p>
+            <a:pPr marL="1257300" lvl="2" indent="-342900">
+              <a:buFont typeface="Arial" panose="020B0604020202020204" pitchFamily="34" charset="0"/>
+              <a:buChar char="•"/>
+            </a:pPr>
+            <a:r>
+              <a:rPr lang="en-US" dirty="0" smtClean="0"/>
+              <a:t>Power</a:t>
+            </a:r>
+          </a:p>
+          <a:p>
+            <a:pPr marL="1257300" lvl="2" indent="-342900">
+              <a:buFont typeface="Arial" panose="020B0604020202020204" pitchFamily="34" charset="0"/>
+              <a:buChar char="•"/>
+            </a:pPr>
+            <a:r>
+              <a:rPr lang="en-US" dirty="0" smtClean="0"/>
+              <a:t>ISRU</a:t>
+            </a:r>
+          </a:p>
+          <a:p>
+            <a:pPr marL="1257300" lvl="2" indent="-342900">
+              <a:buFont typeface="Arial" panose="020B0604020202020204" pitchFamily="34" charset="0"/>
+              <a:buChar char="•"/>
+            </a:pPr>
+            <a:r>
+              <a:rPr lang="en-US" dirty="0" smtClean="0"/>
+              <a:t>ISFR</a:t>
+            </a:r>
+          </a:p>
+          <a:p>
+            <a:pPr marL="1257300" lvl="2" indent="-342900">
+              <a:buFont typeface="Arial" panose="020B0604020202020204" pitchFamily="34" charset="0"/>
+              <a:buChar char="•"/>
+            </a:pPr>
+            <a:r>
+              <a:rPr lang="en-US" dirty="0" smtClean="0"/>
+              <a:t>Staging</a:t>
+            </a:r>
+          </a:p>
+          <a:p>
+            <a:pPr marL="1257300" lvl="2" indent="-342900">
+              <a:buFont typeface="Arial" panose="020B0604020202020204" pitchFamily="34" charset="0"/>
+              <a:buChar char="•"/>
+            </a:pPr>
+            <a:endParaRPr lang="en-US" sz="1600" dirty="0" smtClean="0"/>
+          </a:p>
+          <a:p>
+            <a:pPr marL="800100" lvl="1" indent="-342900">
+              <a:buFont typeface="Arial" panose="020B0604020202020204" pitchFamily="34" charset="0"/>
+              <a:buChar char="•"/>
+            </a:pPr>
+            <a:endParaRPr lang="en-US" sz="2400" dirty="0" smtClean="0"/>
+          </a:p>
+        </p:txBody>
+      </p:sp>
+      <p:pic>
+        <p:nvPicPr>
+          <p:cNvPr id="8" name="Picture 7"/>
+          <p:cNvPicPr>
+            <a:picLocks noChangeAspect="1"/>
+          </p:cNvPicPr>
+          <p:nvPr/>
+        </p:nvPicPr>
+        <p:blipFill>
+          <a:blip r:embed="rId3"/>
+          <a:stretch>
+            <a:fillRect/>
+          </a:stretch>
+        </p:blipFill>
+        <p:spPr>
+          <a:xfrm>
+            <a:off x="76200" y="3886200"/>
+            <a:ext cx="8931708" cy="2362533"/>
+          </a:xfrm>
+          <a:prstGeom prst="rect">
+            <a:avLst/>
+          </a:prstGeom>
+        </p:spPr>
+      </p:pic>
     </p:spTree>
     <p:extLst>
       <p:ext uri="{BB962C8B-B14F-4D97-AF65-F5344CB8AC3E}">
-        <p14:creationId xmlns:p14="http://schemas.microsoft.com/office/powerpoint/2010/main" val="1404889025"/>
+        <p14:creationId xmlns:p14="http://schemas.microsoft.com/office/powerpoint/2010/main" val="1313908389"/>
       </p:ext>
     </p:extLst>
   </p:cSld>
@@ -5664,7 +6985,11 @@
           <a:p>
             <a:r>
               <a:rPr lang="en-US" dirty="0" smtClean="0"/>
-              <a:t>Multi-Objective Optimization</a:t>
+              <a:t>Problem </a:t>
+            </a:r>
+            <a:r>
+              <a:rPr lang="en-US" dirty="0" smtClean="0"/>
+              <a:t>Statement</a:t>
             </a:r>
             <a:endParaRPr lang="en-US" dirty="0"/>
           </a:p>
@@ -5672,7 +6997,7 @@
       </p:sp>
       <p:sp>
         <p:nvSpPr>
-          <p:cNvPr id="5" name="Slide Number Placeholder 4"/>
+          <p:cNvPr id="4" name="Slide Number Placeholder 3"/>
           <p:cNvSpPr>
             <a:spLocks noGrp="1"/>
           </p:cNvSpPr>
@@ -5711,10 +7036,82 @@
           </a:p>
         </p:txBody>
       </p:sp>
+      <p:pic>
+        <p:nvPicPr>
+          <p:cNvPr id="3" name="Picture 2"/>
+          <p:cNvPicPr>
+            <a:picLocks noChangeAspect="1"/>
+          </p:cNvPicPr>
+          <p:nvPr/>
+        </p:nvPicPr>
+        <p:blipFill>
+          <a:blip r:embed="rId3"/>
+          <a:stretch>
+            <a:fillRect/>
+          </a:stretch>
+        </p:blipFill>
+        <p:spPr>
+          <a:xfrm>
+            <a:off x="1600198" y="964190"/>
+            <a:ext cx="6096000" cy="744682"/>
+          </a:xfrm>
+          <a:prstGeom prst="rect">
+            <a:avLst/>
+          </a:prstGeom>
+        </p:spPr>
+      </p:pic>
+      <p:pic>
+        <p:nvPicPr>
+          <p:cNvPr id="5" name="Picture 4"/>
+          <p:cNvPicPr>
+            <a:picLocks noChangeAspect="1"/>
+          </p:cNvPicPr>
+          <p:nvPr/>
+        </p:nvPicPr>
+        <p:blipFill>
+          <a:blip r:embed="rId4"/>
+          <a:stretch>
+            <a:fillRect/>
+          </a:stretch>
+        </p:blipFill>
+        <p:spPr>
+          <a:xfrm>
+            <a:off x="2331892" y="1703242"/>
+            <a:ext cx="4632614" cy="2727614"/>
+          </a:xfrm>
+          <a:prstGeom prst="rect">
+            <a:avLst/>
+          </a:prstGeom>
+        </p:spPr>
+      </p:pic>
+      <p:pic>
+        <p:nvPicPr>
+          <p:cNvPr id="6" name="Picture 5"/>
+          <p:cNvPicPr>
+            <a:picLocks noChangeAspect="1"/>
+          </p:cNvPicPr>
+          <p:nvPr/>
+        </p:nvPicPr>
+        <p:blipFill>
+          <a:blip r:embed="rId5"/>
+          <a:stretch>
+            <a:fillRect/>
+          </a:stretch>
+        </p:blipFill>
+        <p:spPr>
+          <a:xfrm>
+            <a:off x="347660" y="4430856"/>
+            <a:ext cx="8601075" cy="2275077"/>
+          </a:xfrm>
+          <a:prstGeom prst="rect">
+            <a:avLst/>
+          </a:prstGeom>
+        </p:spPr>
+      </p:pic>
     </p:spTree>
     <p:extLst>
       <p:ext uri="{BB962C8B-B14F-4D97-AF65-F5344CB8AC3E}">
-        <p14:creationId xmlns:p14="http://schemas.microsoft.com/office/powerpoint/2010/main" val="4109803144"/>
+        <p14:creationId xmlns:p14="http://schemas.microsoft.com/office/powerpoint/2010/main" val="3617579299"/>
       </p:ext>
     </p:extLst>
   </p:cSld>
@@ -5758,7 +7155,11 @@
           <a:p>
             <a:r>
               <a:rPr lang="en-US" dirty="0" smtClean="0"/>
-              <a:t>Final Recommendation</a:t>
+              <a:t>Modeling and </a:t>
+            </a:r>
+            <a:r>
+              <a:rPr lang="en-US" dirty="0" smtClean="0"/>
+              <a:t>Simulation</a:t>
             </a:r>
             <a:endParaRPr lang="en-US" dirty="0"/>
           </a:p>
@@ -5766,7 +7167,7 @@
       </p:sp>
       <p:sp>
         <p:nvSpPr>
-          <p:cNvPr id="4" name="Slide Number Placeholder 3"/>
+          <p:cNvPr id="3" name="Slide Number Placeholder 2"/>
           <p:cNvSpPr>
             <a:spLocks noGrp="1"/>
           </p:cNvSpPr>
@@ -5808,7 +7209,7 @@
     </p:spTree>
     <p:extLst>
       <p:ext uri="{BB962C8B-B14F-4D97-AF65-F5344CB8AC3E}">
-        <p14:creationId xmlns:p14="http://schemas.microsoft.com/office/powerpoint/2010/main" val="875133285"/>
+        <p14:creationId xmlns:p14="http://schemas.microsoft.com/office/powerpoint/2010/main" val="1569832416"/>
       </p:ext>
     </p:extLst>
   </p:cSld>
@@ -5852,7 +7253,18 @@
           <a:p>
             <a:r>
               <a:rPr lang="en-US" dirty="0" smtClean="0"/>
-              <a:t>Learnings and Future Work</a:t>
+              <a:t>Modeling and </a:t>
+            </a:r>
+            <a:r>
+              <a:rPr lang="en-US" dirty="0" smtClean="0"/>
+              <a:t>Simulation:</a:t>
+            </a:r>
+            <a:br>
+              <a:rPr lang="en-US" dirty="0" smtClean="0"/>
+            </a:br>
+            <a:r>
+              <a:rPr lang="en-US" dirty="0" smtClean="0"/>
+              <a:t>DSM</a:t>
             </a:r>
             <a:endParaRPr lang="en-US" dirty="0"/>
           </a:p>
@@ -5860,7 +7272,7 @@
       </p:sp>
       <p:sp>
         <p:nvSpPr>
-          <p:cNvPr id="12" name="Slide Number Placeholder 3"/>
+          <p:cNvPr id="3" name="Slide Number Placeholder 2"/>
           <p:cNvSpPr>
             <a:spLocks noGrp="1"/>
           </p:cNvSpPr>
@@ -5868,12 +7280,7 @@
             <p:ph type="sldNum" sz="quarter" idx="12"/>
           </p:nvPr>
         </p:nvSpPr>
-        <p:spPr>
-          <a:xfrm>
-            <a:off x="6553200" y="6172200"/>
-            <a:ext cx="2133600" cy="365125"/>
-          </a:xfrm>
-        </p:spPr>
+        <p:spPr/>
         <p:txBody>
           <a:bodyPr/>
           <a:lstStyle/>
@@ -5881,17 +7288,20 @@
             <a:pPr>
               <a:defRPr/>
             </a:pPr>
-            <a:r>
-              <a:rPr lang="en-US" dirty="0">
+            <a:fld id="{6E3317FF-6423-48BB-8CF6-A5183FB2D75B}" type="slidenum">
+              <a:rPr lang="en-US" smtClean="0">
                 <a:solidFill>
                   <a:prstClr val="black">
                     <a:tint val="75000"/>
                   </a:prstClr>
                 </a:solidFill>
               </a:rPr>
+              <a:pPr>
+                <a:defRPr/>
+              </a:pPr>
               <a:t>8</a:t>
-            </a:r>
-            <a:endParaRPr lang="en-US" dirty="0">
+            </a:fld>
+            <a:endParaRPr lang="en-US">
               <a:solidFill>
                 <a:prstClr val="black">
                   <a:tint val="75000"/>
@@ -5901,10 +7311,134 @@
           </a:p>
         </p:txBody>
       </p:sp>
+      <p:pic>
+        <p:nvPicPr>
+          <p:cNvPr id="4" name="Picture 3"/>
+          <p:cNvPicPr>
+            <a:picLocks noChangeAspect="1"/>
+          </p:cNvPicPr>
+          <p:nvPr/>
+        </p:nvPicPr>
+        <p:blipFill>
+          <a:blip r:embed="rId2">
+            <a:extLst>
+              <a:ext uri="{28A0092B-C50C-407E-A947-70E740481C1C}">
+                <a14:useLocalDpi xmlns:a14="http://schemas.microsoft.com/office/drawing/2010/main" val="0"/>
+              </a:ext>
+            </a:extLst>
+          </a:blip>
+          <a:stretch>
+            <a:fillRect/>
+          </a:stretch>
+        </p:blipFill>
+        <p:spPr>
+          <a:xfrm>
+            <a:off x="609600" y="1636126"/>
+            <a:ext cx="7924800" cy="4718636"/>
+          </a:xfrm>
+          <a:prstGeom prst="rect">
+            <a:avLst/>
+          </a:prstGeom>
+        </p:spPr>
+      </p:pic>
     </p:spTree>
     <p:extLst>
       <p:ext uri="{BB962C8B-B14F-4D97-AF65-F5344CB8AC3E}">
-        <p14:creationId xmlns:p14="http://schemas.microsoft.com/office/powerpoint/2010/main" val="300718594"/>
+        <p14:creationId xmlns:p14="http://schemas.microsoft.com/office/powerpoint/2010/main" val="1103405663"/>
+      </p:ext>
+    </p:extLst>
+  </p:cSld>
+  <p:clrMapOvr>
+    <a:masterClrMapping/>
+  </p:clrMapOvr>
+</p:sld>
+</file>
+
+<file path=ppt/slides/slide9.xml><?xml version="1.0" encoding="utf-8"?>
+<p:sld xmlns:a="http://schemas.openxmlformats.org/drawingml/2006/main" xmlns:r="http://schemas.openxmlformats.org/officeDocument/2006/relationships" xmlns:p="http://schemas.openxmlformats.org/presentationml/2006/main">
+  <p:cSld>
+    <p:spTree>
+      <p:nvGrpSpPr>
+        <p:cNvPr id="1" name=""/>
+        <p:cNvGrpSpPr/>
+        <p:nvPr/>
+      </p:nvGrpSpPr>
+      <p:grpSpPr>
+        <a:xfrm>
+          <a:off x="0" y="0"/>
+          <a:ext cx="0" cy="0"/>
+          <a:chOff x="0" y="0"/>
+          <a:chExt cx="0" cy="0"/>
+        </a:xfrm>
+      </p:grpSpPr>
+      <p:sp>
+        <p:nvSpPr>
+          <p:cNvPr id="2" name="Title 1"/>
+          <p:cNvSpPr>
+            <a:spLocks noGrp="1"/>
+          </p:cNvSpPr>
+          <p:nvPr>
+            <p:ph type="title"/>
+          </p:nvPr>
+        </p:nvSpPr>
+        <p:spPr/>
+        <p:txBody>
+          <a:bodyPr/>
+          <a:lstStyle/>
+          <a:p>
+            <a:r>
+              <a:rPr lang="en-US" dirty="0" smtClean="0"/>
+              <a:t>Modeling and Simulation</a:t>
+            </a:r>
+            <a:endParaRPr lang="en-US" dirty="0"/>
+          </a:p>
+        </p:txBody>
+      </p:sp>
+      <p:sp>
+        <p:nvSpPr>
+          <p:cNvPr id="3" name="Slide Number Placeholder 2"/>
+          <p:cNvSpPr>
+            <a:spLocks noGrp="1"/>
+          </p:cNvSpPr>
+          <p:nvPr>
+            <p:ph type="sldNum" sz="quarter" idx="12"/>
+          </p:nvPr>
+        </p:nvSpPr>
+        <p:spPr/>
+        <p:txBody>
+          <a:bodyPr/>
+          <a:lstStyle/>
+          <a:p>
+            <a:pPr>
+              <a:defRPr/>
+            </a:pPr>
+            <a:fld id="{6E3317FF-6423-48BB-8CF6-A5183FB2D75B}" type="slidenum">
+              <a:rPr lang="en-US" smtClean="0">
+                <a:solidFill>
+                  <a:prstClr val="black">
+                    <a:tint val="75000"/>
+                  </a:prstClr>
+                </a:solidFill>
+              </a:rPr>
+              <a:pPr>
+                <a:defRPr/>
+              </a:pPr>
+              <a:t>9</a:t>
+            </a:fld>
+            <a:endParaRPr lang="en-US">
+              <a:solidFill>
+                <a:prstClr val="black">
+                  <a:tint val="75000"/>
+                </a:prstClr>
+              </a:solidFill>
+            </a:endParaRPr>
+          </a:p>
+        </p:txBody>
+      </p:sp>
+    </p:spTree>
+    <p:extLst>
+      <p:ext uri="{BB962C8B-B14F-4D97-AF65-F5344CB8AC3E}">
+        <p14:creationId xmlns:p14="http://schemas.microsoft.com/office/powerpoint/2010/main" val="991219898"/>
       </p:ext>
     </p:extLst>
   </p:cSld>

</xml_diff>

<commit_message>
Model & multi - Presentation
</commit_message>
<xml_diff>
--- a/MSDO/Assignment5/Mars 2040 Optimization Presentation.pptx
+++ b/MSDO/Assignment5/Mars 2040 Optimization Presentation.pptx
@@ -5,7 +5,7 @@
     <p:sldMasterId id="2147483673" r:id="rId1"/>
   </p:sldMasterIdLst>
   <p:notesMasterIdLst>
-    <p:notesMasterId r:id="rId15"/>
+    <p:notesMasterId r:id="rId16"/>
   </p:notesMasterIdLst>
   <p:sldIdLst>
     <p:sldId id="448" r:id="rId2"/>
@@ -18,9 +18,10 @@
     <p:sldId id="567" r:id="rId9"/>
     <p:sldId id="575" r:id="rId10"/>
     <p:sldId id="568" r:id="rId11"/>
-    <p:sldId id="569" r:id="rId12"/>
-    <p:sldId id="570" r:id="rId13"/>
-    <p:sldId id="571" r:id="rId14"/>
+    <p:sldId id="577" r:id="rId12"/>
+    <p:sldId id="578" r:id="rId13"/>
+    <p:sldId id="570" r:id="rId14"/>
+    <p:sldId id="571" r:id="rId15"/>
   </p:sldIdLst>
   <p:sldSz cx="9144000" cy="6858000" type="screen4x3"/>
   <p:notesSz cx="6858000" cy="9144000"/>
@@ -220,7 +221,7 @@
           <a:p>
             <a:fld id="{D292ED30-0A90-45AA-9637-D363BB894E5D}" type="datetimeFigureOut">
               <a:rPr lang="en-US" smtClean="0"/>
-              <a:t>5/8/2016</a:t>
+              <a:t>5/9/2016</a:t>
             </a:fld>
             <a:endParaRPr lang="en-US"/>
           </a:p>
@@ -1239,7 +1240,7 @@
           <a:p>
             <a:fld id="{380EEE09-4C39-4D5E-9E9F-B9379C5BD052}" type="slidenum">
               <a:rPr lang="en-US" smtClean="0"/>
-              <a:t>12</a:t>
+              <a:t>13</a:t>
             </a:fld>
             <a:endParaRPr lang="en-US"/>
           </a:p>
@@ -1366,7 +1367,7 @@
                   </a:prstClr>
                 </a:solidFill>
               </a:rPr>
-              <a:t>5/8/2016</a:t>
+              <a:t>5/9/2016</a:t>
             </a:fld>
             <a:endParaRPr lang="en-US">
               <a:solidFill>
@@ -1590,7 +1591,7 @@
                   </a:prstClr>
                 </a:solidFill>
               </a:rPr>
-              <a:t>5/8/2016</a:t>
+              <a:t>5/9/2016</a:t>
             </a:fld>
             <a:endParaRPr lang="en-US">
               <a:solidFill>
@@ -1831,7 +1832,7 @@
                   </a:prstClr>
                 </a:solidFill>
               </a:rPr>
-              <a:t>5/8/2016</a:t>
+              <a:t>5/9/2016</a:t>
             </a:fld>
             <a:endParaRPr lang="en-US">
               <a:solidFill>
@@ -2055,7 +2056,7 @@
                   </a:prstClr>
                 </a:solidFill>
               </a:rPr>
-              <a:t>5/8/2016</a:t>
+              <a:t>5/9/2016</a:t>
             </a:fld>
             <a:endParaRPr lang="en-US">
               <a:solidFill>
@@ -2363,7 +2364,7 @@
                   </a:prstClr>
                 </a:solidFill>
               </a:rPr>
-              <a:t>5/8/2016</a:t>
+              <a:t>5/9/2016</a:t>
             </a:fld>
             <a:endParaRPr lang="en-US">
               <a:solidFill>
@@ -2663,7 +2664,7 @@
                   </a:prstClr>
                 </a:solidFill>
               </a:rPr>
-              <a:t>5/8/2016</a:t>
+              <a:t>5/9/2016</a:t>
             </a:fld>
             <a:endParaRPr lang="en-US">
               <a:solidFill>
@@ -3005,7 +3006,7 @@
                   </a:prstClr>
                 </a:solidFill>
               </a:rPr>
-              <a:t>5/8/2016</a:t>
+              <a:t>5/9/2016</a:t>
             </a:fld>
             <a:endParaRPr lang="en-US">
               <a:solidFill>
@@ -3481,7 +3482,7 @@
                   </a:prstClr>
                 </a:solidFill>
               </a:rPr>
-              <a:t>5/8/2016</a:t>
+              <a:t>5/9/2016</a:t>
             </a:fld>
             <a:endParaRPr lang="en-US">
               <a:solidFill>
@@ -3653,7 +3654,7 @@
                   </a:prstClr>
                 </a:solidFill>
               </a:rPr>
-              <a:t>5/8/2016</a:t>
+              <a:t>5/9/2016</a:t>
             </a:fld>
             <a:endParaRPr lang="en-US">
               <a:solidFill>
@@ -3809,7 +3810,7 @@
                   </a:prstClr>
                 </a:solidFill>
               </a:rPr>
-              <a:t>5/8/2016</a:t>
+              <a:t>5/9/2016</a:t>
             </a:fld>
             <a:endParaRPr lang="en-US">
               <a:solidFill>
@@ -4140,7 +4141,7 @@
                   </a:prstClr>
                 </a:solidFill>
               </a:rPr>
-              <a:t>5/8/2016</a:t>
+              <a:t>5/9/2016</a:t>
             </a:fld>
             <a:endParaRPr lang="en-US">
               <a:solidFill>
@@ -4450,7 +4451,7 @@
                   </a:prstClr>
                 </a:solidFill>
               </a:rPr>
-              <a:t>5/8/2016</a:t>
+              <a:t>5/9/2016</a:t>
             </a:fld>
             <a:endParaRPr lang="en-US">
               <a:solidFill>
@@ -4717,7 +4718,7 @@
                   </a:prstClr>
                 </a:solidFill>
               </a:rPr>
-              <a:t>5/8/2016</a:t>
+              <a:t>5/9/2016</a:t>
             </a:fld>
             <a:endParaRPr lang="en-US">
               <a:solidFill>
@@ -5812,10 +5813,40 @@
           </a:p>
         </p:txBody>
       </p:sp>
+      <p:pic>
+        <p:nvPicPr>
+          <p:cNvPr id="3" name="Picture 2"/>
+          <p:cNvPicPr>
+            <a:picLocks noChangeAspect="1"/>
+          </p:cNvPicPr>
+          <p:nvPr/>
+        </p:nvPicPr>
+        <p:blipFill>
+          <a:blip r:embed="rId2">
+            <a:extLst>
+              <a:ext uri="{28A0092B-C50C-407E-A947-70E740481C1C}">
+                <a14:useLocalDpi xmlns:a14="http://schemas.microsoft.com/office/drawing/2010/main" val="0"/>
+              </a:ext>
+            </a:extLst>
+          </a:blip>
+          <a:stretch>
+            <a:fillRect/>
+          </a:stretch>
+        </p:blipFill>
+        <p:spPr>
+          <a:xfrm>
+            <a:off x="990600" y="1066800"/>
+            <a:ext cx="7048885" cy="5714792"/>
+          </a:xfrm>
+          <a:prstGeom prst="rect">
+            <a:avLst/>
+          </a:prstGeom>
+        </p:spPr>
+      </p:pic>
     </p:spTree>
     <p:extLst>
       <p:ext uri="{BB962C8B-B14F-4D97-AF65-F5344CB8AC3E}">
-        <p14:creationId xmlns:p14="http://schemas.microsoft.com/office/powerpoint/2010/main" val="4109803144"/>
+        <p14:creationId xmlns:p14="http://schemas.microsoft.com/office/powerpoint/2010/main" val="4266063036"/>
       </p:ext>
     </p:extLst>
   </p:cSld>
@@ -5859,7 +5890,7 @@
           <a:p>
             <a:r>
               <a:rPr lang="en-US" dirty="0" smtClean="0"/>
-              <a:t>Final Recommendation</a:t>
+              <a:t>Multi-Objective Optimization</a:t>
             </a:r>
             <a:endParaRPr lang="en-US" dirty="0"/>
           </a:p>
@@ -5867,7 +5898,7 @@
       </p:sp>
       <p:sp>
         <p:nvSpPr>
-          <p:cNvPr id="4" name="Slide Number Placeholder 3"/>
+          <p:cNvPr id="5" name="Slide Number Placeholder 4"/>
           <p:cNvSpPr>
             <a:spLocks noGrp="1"/>
           </p:cNvSpPr>
@@ -5906,6 +5937,130 @@
           </a:p>
         </p:txBody>
       </p:sp>
+      <p:pic>
+        <p:nvPicPr>
+          <p:cNvPr id="6" name="Picture 5"/>
+          <p:cNvPicPr>
+            <a:picLocks noChangeAspect="1"/>
+          </p:cNvPicPr>
+          <p:nvPr/>
+        </p:nvPicPr>
+        <p:blipFill>
+          <a:blip r:embed="rId2">
+            <a:extLst>
+              <a:ext uri="{28A0092B-C50C-407E-A947-70E740481C1C}">
+                <a14:useLocalDpi xmlns:a14="http://schemas.microsoft.com/office/drawing/2010/main" val="0"/>
+              </a:ext>
+            </a:extLst>
+          </a:blip>
+          <a:stretch>
+            <a:fillRect/>
+          </a:stretch>
+        </p:blipFill>
+        <p:spPr>
+          <a:xfrm>
+            <a:off x="1143000" y="1172127"/>
+            <a:ext cx="6761905" cy="5171429"/>
+          </a:xfrm>
+          <a:prstGeom prst="rect">
+            <a:avLst/>
+          </a:prstGeom>
+        </p:spPr>
+      </p:pic>
+    </p:spTree>
+    <p:extLst>
+      <p:ext uri="{BB962C8B-B14F-4D97-AF65-F5344CB8AC3E}">
+        <p14:creationId xmlns:p14="http://schemas.microsoft.com/office/powerpoint/2010/main" val="723378307"/>
+      </p:ext>
+    </p:extLst>
+  </p:cSld>
+  <p:clrMapOvr>
+    <a:masterClrMapping/>
+  </p:clrMapOvr>
+</p:sld>
+</file>
+
+<file path=ppt/slides/slide13.xml><?xml version="1.0" encoding="utf-8"?>
+<p:sld xmlns:a="http://schemas.openxmlformats.org/drawingml/2006/main" xmlns:r="http://schemas.openxmlformats.org/officeDocument/2006/relationships" xmlns:p="http://schemas.openxmlformats.org/presentationml/2006/main">
+  <p:cSld>
+    <p:spTree>
+      <p:nvGrpSpPr>
+        <p:cNvPr id="1" name=""/>
+        <p:cNvGrpSpPr/>
+        <p:nvPr/>
+      </p:nvGrpSpPr>
+      <p:grpSpPr>
+        <a:xfrm>
+          <a:off x="0" y="0"/>
+          <a:ext cx="0" cy="0"/>
+          <a:chOff x="0" y="0"/>
+          <a:chExt cx="0" cy="0"/>
+        </a:xfrm>
+      </p:grpSpPr>
+      <p:sp>
+        <p:nvSpPr>
+          <p:cNvPr id="2" name="Title 1"/>
+          <p:cNvSpPr>
+            <a:spLocks noGrp="1"/>
+          </p:cNvSpPr>
+          <p:nvPr>
+            <p:ph type="title"/>
+          </p:nvPr>
+        </p:nvSpPr>
+        <p:spPr/>
+        <p:txBody>
+          <a:bodyPr/>
+          <a:lstStyle/>
+          <a:p>
+            <a:r>
+              <a:rPr lang="en-US" dirty="0" smtClean="0"/>
+              <a:t>Final Recommendation</a:t>
+            </a:r>
+            <a:endParaRPr lang="en-US" dirty="0"/>
+          </a:p>
+        </p:txBody>
+      </p:sp>
+      <p:sp>
+        <p:nvSpPr>
+          <p:cNvPr id="4" name="Slide Number Placeholder 3"/>
+          <p:cNvSpPr>
+            <a:spLocks noGrp="1"/>
+          </p:cNvSpPr>
+          <p:nvPr>
+            <p:ph type="sldNum" sz="quarter" idx="12"/>
+          </p:nvPr>
+        </p:nvSpPr>
+        <p:spPr/>
+        <p:txBody>
+          <a:bodyPr/>
+          <a:lstStyle/>
+          <a:p>
+            <a:pPr>
+              <a:defRPr/>
+            </a:pPr>
+            <a:fld id="{6E3317FF-6423-48BB-8CF6-A5183FB2D75B}" type="slidenum">
+              <a:rPr lang="en-US" smtClean="0">
+                <a:solidFill>
+                  <a:prstClr val="black">
+                    <a:tint val="75000"/>
+                  </a:prstClr>
+                </a:solidFill>
+              </a:rPr>
+              <a:pPr>
+                <a:defRPr/>
+              </a:pPr>
+              <a:t>13</a:t>
+            </a:fld>
+            <a:endParaRPr lang="en-US">
+              <a:solidFill>
+                <a:prstClr val="black">
+                  <a:tint val="75000"/>
+                </a:prstClr>
+              </a:solidFill>
+            </a:endParaRPr>
+          </a:p>
+        </p:txBody>
+      </p:sp>
     </p:spTree>
     <p:extLst>
       <p:ext uri="{BB962C8B-B14F-4D97-AF65-F5344CB8AC3E}">
@@ -5919,7 +6074,7 @@
 </p:sld>
 </file>
 
-<file path=ppt/slides/slide13.xml><?xml version="1.0" encoding="utf-8"?>
+<file path=ppt/slides/slide14.xml><?xml version="1.0" encoding="utf-8"?>
 <p:sld xmlns:a="http://schemas.openxmlformats.org/drawingml/2006/main" xmlns:r="http://schemas.openxmlformats.org/officeDocument/2006/relationships" xmlns:p="http://schemas.openxmlformats.org/presentationml/2006/main">
   <p:cSld>
     <p:spTree>
@@ -6104,7 +6259,6 @@
               <a:rPr lang="en-US" sz="2400" dirty="0" smtClean="0"/>
               <a:t>US Space Policy, NASA’s “Journey to Mars”</a:t>
             </a:r>
-            <a:endParaRPr lang="en-US" sz="2400" dirty="0" smtClean="0"/>
           </a:p>
           <a:p>
             <a:pPr marL="742950" lvl="1" indent="-285750">
@@ -6672,11 +6826,7 @@
             </a:pPr>
             <a:r>
               <a:rPr lang="en-US" sz="2000" dirty="0" smtClean="0"/>
-              <a:t>2 Continuous </a:t>
-            </a:r>
-            <a:r>
-              <a:rPr lang="en-US" sz="2000" dirty="0" smtClean="0"/>
-              <a:t>Variables</a:t>
+              <a:t>2 Continuous Variables</a:t>
             </a:r>
           </a:p>
           <a:p>
@@ -6706,7 +6856,6 @@
               <a:rPr lang="en-US" sz="2000" dirty="0" smtClean="0"/>
               <a:t>Location, Population, and Food directly affect Science Utility</a:t>
             </a:r>
-            <a:endParaRPr lang="en-US" sz="2000" dirty="0" smtClean="0"/>
           </a:p>
         </p:txBody>
       </p:sp>
@@ -7297,7 +7446,18 @@
           <a:p>
             <a:r>
               <a:rPr lang="en-US" dirty="0" smtClean="0"/>
-              <a:t>Modeling and Simulation</a:t>
+              <a:t>Modeling and </a:t>
+            </a:r>
+            <a:r>
+              <a:rPr lang="en-US" dirty="0" smtClean="0"/>
+              <a:t>Simulation:</a:t>
+            </a:r>
+            <a:br>
+              <a:rPr lang="en-US" dirty="0" smtClean="0"/>
+            </a:br>
+            <a:r>
+              <a:rPr lang="en-US" dirty="0" smtClean="0"/>
+              <a:t>Modules</a:t>
             </a:r>
             <a:endParaRPr lang="en-US" dirty="0"/>
           </a:p>
@@ -7344,6 +7504,47 @@
           </a:p>
         </p:txBody>
       </p:sp>
+      <p:pic>
+        <p:nvPicPr>
+          <p:cNvPr id="4" name="Picture 2" descr="https://lh5.googleusercontent.com/vmoWZSPo023tdwkjIegTWlae3rZUg6xADkfSoLjAPFhqGu3n3tZ-vuoCniTJ6y14tUWa43U55P8Br9htsihiVfOrPYK2BHnrxLsUknOi0WHBdceciNuO-AA3YGTMTPAK0Lgco_11kw"/>
+          <p:cNvPicPr>
+            <a:picLocks noChangeAspect="1" noChangeArrowheads="1"/>
+          </p:cNvPicPr>
+          <p:nvPr/>
+        </p:nvPicPr>
+        <p:blipFill>
+          <a:blip r:embed="rId2">
+            <a:extLst>
+              <a:ext uri="{28A0092B-C50C-407E-A947-70E740481C1C}">
+                <a14:useLocalDpi xmlns:a14="http://schemas.microsoft.com/office/drawing/2010/main" val="0"/>
+              </a:ext>
+            </a:extLst>
+          </a:blip>
+          <a:srcRect/>
+          <a:stretch>
+            <a:fillRect/>
+          </a:stretch>
+        </p:blipFill>
+        <p:spPr bwMode="auto">
+          <a:xfrm>
+            <a:off x="558946" y="1371600"/>
+            <a:ext cx="8127854" cy="4800600"/>
+          </a:xfrm>
+          <a:prstGeom prst="rect">
+            <a:avLst/>
+          </a:prstGeom>
+          <a:noFill/>
+          <a:extLst>
+            <a:ext uri="{909E8E84-426E-40DD-AFC4-6F175D3DCCD1}">
+              <a14:hiddenFill xmlns:a14="http://schemas.microsoft.com/office/drawing/2010/main">
+                <a:solidFill>
+                  <a:srgbClr val="FFFFFF"/>
+                </a:solidFill>
+              </a14:hiddenFill>
+            </a:ext>
+          </a:extLst>
+        </p:spPr>
+      </p:pic>
     </p:spTree>
     <p:extLst>
       <p:ext uri="{BB962C8B-B14F-4D97-AF65-F5344CB8AC3E}">
@@ -7354,6 +7555,92 @@
   <p:clrMapOvr>
     <a:masterClrMapping/>
   </p:clrMapOvr>
+  <p:timing>
+    <p:tnLst>
+      <p:par>
+        <p:cTn id="1" dur="indefinite" restart="never" nodeType="tmRoot">
+          <p:childTnLst>
+            <p:seq concurrent="1" nextAc="seek">
+              <p:cTn id="2" dur="indefinite" nodeType="mainSeq">
+                <p:childTnLst>
+                  <p:par>
+                    <p:cTn id="3" fill="hold">
+                      <p:stCondLst>
+                        <p:cond delay="indefinite"/>
+                        <p:cond evt="onBegin" delay="0">
+                          <p:tn val="2"/>
+                        </p:cond>
+                      </p:stCondLst>
+                      <p:childTnLst>
+                        <p:par>
+                          <p:cTn id="4" fill="hold">
+                            <p:stCondLst>
+                              <p:cond delay="0"/>
+                            </p:stCondLst>
+                            <p:childTnLst>
+                              <p:par>
+                                <p:cTn id="5" presetID="10" presetClass="entr" presetSubtype="0" fill="hold" nodeType="withEffect">
+                                  <p:stCondLst>
+                                    <p:cond delay="0"/>
+                                  </p:stCondLst>
+                                  <p:childTnLst>
+                                    <p:set>
+                                      <p:cBhvr>
+                                        <p:cTn id="6" dur="1" fill="hold">
+                                          <p:stCondLst>
+                                            <p:cond delay="0"/>
+                                          </p:stCondLst>
+                                        </p:cTn>
+                                        <p:tgtEl>
+                                          <p:spTgt spid="4"/>
+                                        </p:tgtEl>
+                                        <p:attrNameLst>
+                                          <p:attrName>style.visibility</p:attrName>
+                                        </p:attrNameLst>
+                                      </p:cBhvr>
+                                      <p:to>
+                                        <p:strVal val="visible"/>
+                                      </p:to>
+                                    </p:set>
+                                    <p:animEffect transition="in" filter="fade">
+                                      <p:cBhvr>
+                                        <p:cTn id="7" dur="500"/>
+                                        <p:tgtEl>
+                                          <p:spTgt spid="4"/>
+                                        </p:tgtEl>
+                                      </p:cBhvr>
+                                    </p:animEffect>
+                                  </p:childTnLst>
+                                </p:cTn>
+                              </p:par>
+                            </p:childTnLst>
+                          </p:cTn>
+                        </p:par>
+                      </p:childTnLst>
+                    </p:cTn>
+                  </p:par>
+                </p:childTnLst>
+              </p:cTn>
+              <p:prevCondLst>
+                <p:cond evt="onPrev" delay="0">
+                  <p:tgtEl>
+                    <p:sldTgt/>
+                  </p:tgtEl>
+                </p:cond>
+              </p:prevCondLst>
+              <p:nextCondLst>
+                <p:cond evt="onNext" delay="0">
+                  <p:tgtEl>
+                    <p:sldTgt/>
+                  </p:tgtEl>
+                </p:cond>
+              </p:nextCondLst>
+            </p:seq>
+          </p:childTnLst>
+        </p:cTn>
+      </p:par>
+    </p:tnLst>
+  </p:timing>
 </p:sld>
 </file>
 
@@ -7505,7 +7792,6 @@
               <a:rPr lang="en-US" sz="2400" dirty="0" smtClean="0"/>
               <a:t>Reordered to minimize feedback relationships </a:t>
             </a:r>
-            <a:endParaRPr lang="en-US" sz="2400" dirty="0" smtClean="0"/>
           </a:p>
         </p:txBody>
       </p:sp>
@@ -7556,7 +7842,18 @@
           <a:p>
             <a:r>
               <a:rPr lang="en-US" dirty="0" smtClean="0"/>
-              <a:t>Modeling and Simulation</a:t>
+              <a:t>Modeling and </a:t>
+            </a:r>
+            <a:r>
+              <a:rPr lang="en-US" dirty="0" smtClean="0"/>
+              <a:t>Simulation:</a:t>
+            </a:r>
+            <a:br>
+              <a:rPr lang="en-US" dirty="0" smtClean="0"/>
+            </a:br>
+            <a:r>
+              <a:rPr lang="en-US" dirty="0" smtClean="0"/>
+              <a:t>Development Cost</a:t>
             </a:r>
             <a:endParaRPr lang="en-US" dirty="0"/>
           </a:p>

</xml_diff>